<commit_message>
Changes for Mobile Reqs
Changes for Mobile Reqs
</commit_message>
<xml_diff>
--- a/Requirements/NSRetail_Mobile_Requirements.pptx
+++ b/Requirements/NSRetail_Mobile_Requirements.pptx
@@ -3013,7 +3013,7 @@
         <p:spPr>
           <a:xfrm>
             <a:off x="1076325" y="1019175"/>
-            <a:ext cx="4154663" cy="646331"/>
+            <a:ext cx="4154663" cy="830997"/>
           </a:xfrm>
           <a:prstGeom prst="rect">
             <a:avLst/>
@@ -3056,8 +3056,18 @@
             </a:pPr>
             <a:r>
               <a:rPr lang="en-IN" sz="1200" dirty="0" smtClean="0"/>
-              <a:t>If user is valid Navigate to Main Menu</a:t>
-            </a:r>
+              <a:t>If user is valid Navigate to Main </a:t>
+            </a:r>
+            <a:r>
+              <a:rPr lang="en-IN" sz="1200" dirty="0" smtClean="0"/>
+              <a:t>Menu</a:t>
+            </a:r>
+          </a:p>
+          <a:p>
+            <a:pPr marL="285750" lvl="0" indent="-285750">
+              <a:buFont typeface="Arial" panose="020B0604020202020204" pitchFamily="34" charset="0"/>
+              <a:buChar char="•"/>
+            </a:pPr>
             <a:endParaRPr lang="en-IN" sz="1200" dirty="0"/>
           </a:p>
         </p:txBody>
@@ -3236,7 +3246,7 @@
         <p:spPr>
           <a:xfrm>
             <a:off x="971550" y="1247775"/>
-            <a:ext cx="2854564" cy="830997"/>
+            <a:ext cx="3233578" cy="1200329"/>
           </a:xfrm>
           <a:prstGeom prst="rect">
             <a:avLst/>
@@ -3286,6 +3296,17 @@
             <a:r>
               <a:rPr lang="en-IN" sz="1200" dirty="0" smtClean="0"/>
               <a:t>Dispatch</a:t>
+            </a:r>
+          </a:p>
+          <a:p>
+            <a:pPr lvl="0"/>
+            <a:endParaRPr lang="en-IN" sz="1200" dirty="0"/>
+          </a:p>
+          <a:p>
+            <a:pPr lvl="0"/>
+            <a:r>
+              <a:rPr lang="en-IN" sz="1200" dirty="0" smtClean="0"/>
+              <a:t>Login will give access rights to these three  menu</a:t>
             </a:r>
             <a:endParaRPr lang="en-IN" sz="1200" dirty="0"/>
           </a:p>
@@ -4359,23 +4380,7 @@
             </a:pPr>
             <a:r>
               <a:rPr lang="en-IN" sz="1200" dirty="0" smtClean="0"/>
-              <a:t>On selecting branch name </a:t>
-            </a:r>
-            <a:r>
-              <a:rPr lang="en-IN" sz="1200" dirty="0" smtClean="0"/>
-              <a:t>if user having specific category navigate to </a:t>
-            </a:r>
-            <a:r>
-              <a:rPr lang="en-IN" sz="1200" dirty="0" smtClean="0"/>
-              <a:t>dispatch item list other wise navigate to </a:t>
-            </a:r>
-            <a:r>
-              <a:rPr lang="en-IN" sz="1200" dirty="0" smtClean="0"/>
-              <a:t>category </a:t>
-            </a:r>
-            <a:r>
-              <a:rPr lang="en-IN" sz="1200" dirty="0" smtClean="0"/>
-              <a:t>list</a:t>
+              <a:t>On selecting branch name if user having specific category navigate to dispatch item list other wise navigate to category list</a:t>
             </a:r>
           </a:p>
           <a:p>

</xml_diff>

<commit_message>
Changes for branch combobox
Changes for branch combobox
</commit_message>
<xml_diff>
--- a/Requirements/NSRetail_Mobile_Requirements.pptx
+++ b/Requirements/NSRetail_Mobile_Requirements.pptx
@@ -11,6 +11,8 @@
     <p:sldId id="260" r:id="rId5"/>
     <p:sldId id="262" r:id="rId6"/>
     <p:sldId id="257" r:id="rId7"/>
+    <p:sldId id="264" r:id="rId8"/>
+    <p:sldId id="265" r:id="rId9"/>
   </p:sldIdLst>
   <p:sldSz cx="12192000" cy="6858000"/>
   <p:notesSz cx="6858000" cy="9144000"/>
@@ -248,7 +250,7 @@
           <a:p>
             <a:fld id="{F221E457-F2B5-4F65-BEE9-1401C8B172CC}" type="datetimeFigureOut">
               <a:rPr lang="en-IN" smtClean="0"/>
-              <a:t>26-01-2023</a:t>
+              <a:t>30-01-2023</a:t>
             </a:fld>
             <a:endParaRPr lang="en-IN"/>
           </a:p>
@@ -418,7 +420,7 @@
           <a:p>
             <a:fld id="{F221E457-F2B5-4F65-BEE9-1401C8B172CC}" type="datetimeFigureOut">
               <a:rPr lang="en-IN" smtClean="0"/>
-              <a:t>26-01-2023</a:t>
+              <a:t>30-01-2023</a:t>
             </a:fld>
             <a:endParaRPr lang="en-IN"/>
           </a:p>
@@ -598,7 +600,7 @@
           <a:p>
             <a:fld id="{F221E457-F2B5-4F65-BEE9-1401C8B172CC}" type="datetimeFigureOut">
               <a:rPr lang="en-IN" smtClean="0"/>
-              <a:t>26-01-2023</a:t>
+              <a:t>30-01-2023</a:t>
             </a:fld>
             <a:endParaRPr lang="en-IN"/>
           </a:p>
@@ -768,7 +770,7 @@
           <a:p>
             <a:fld id="{F221E457-F2B5-4F65-BEE9-1401C8B172CC}" type="datetimeFigureOut">
               <a:rPr lang="en-IN" smtClean="0"/>
-              <a:t>26-01-2023</a:t>
+              <a:t>30-01-2023</a:t>
             </a:fld>
             <a:endParaRPr lang="en-IN"/>
           </a:p>
@@ -1014,7 +1016,7 @@
           <a:p>
             <a:fld id="{F221E457-F2B5-4F65-BEE9-1401C8B172CC}" type="datetimeFigureOut">
               <a:rPr lang="en-IN" smtClean="0"/>
-              <a:t>26-01-2023</a:t>
+              <a:t>30-01-2023</a:t>
             </a:fld>
             <a:endParaRPr lang="en-IN"/>
           </a:p>
@@ -1246,7 +1248,7 @@
           <a:p>
             <a:fld id="{F221E457-F2B5-4F65-BEE9-1401C8B172CC}" type="datetimeFigureOut">
               <a:rPr lang="en-IN" smtClean="0"/>
-              <a:t>26-01-2023</a:t>
+              <a:t>30-01-2023</a:t>
             </a:fld>
             <a:endParaRPr lang="en-IN"/>
           </a:p>
@@ -1613,7 +1615,7 @@
           <a:p>
             <a:fld id="{F221E457-F2B5-4F65-BEE9-1401C8B172CC}" type="datetimeFigureOut">
               <a:rPr lang="en-IN" smtClean="0"/>
-              <a:t>26-01-2023</a:t>
+              <a:t>30-01-2023</a:t>
             </a:fld>
             <a:endParaRPr lang="en-IN"/>
           </a:p>
@@ -1731,7 +1733,7 @@
           <a:p>
             <a:fld id="{F221E457-F2B5-4F65-BEE9-1401C8B172CC}" type="datetimeFigureOut">
               <a:rPr lang="en-IN" smtClean="0"/>
-              <a:t>26-01-2023</a:t>
+              <a:t>30-01-2023</a:t>
             </a:fld>
             <a:endParaRPr lang="en-IN"/>
           </a:p>
@@ -1826,7 +1828,7 @@
           <a:p>
             <a:fld id="{F221E457-F2B5-4F65-BEE9-1401C8B172CC}" type="datetimeFigureOut">
               <a:rPr lang="en-IN" smtClean="0"/>
-              <a:t>26-01-2023</a:t>
+              <a:t>30-01-2023</a:t>
             </a:fld>
             <a:endParaRPr lang="en-IN"/>
           </a:p>
@@ -2103,7 +2105,7 @@
           <a:p>
             <a:fld id="{F221E457-F2B5-4F65-BEE9-1401C8B172CC}" type="datetimeFigureOut">
               <a:rPr lang="en-IN" smtClean="0"/>
-              <a:t>26-01-2023</a:t>
+              <a:t>30-01-2023</a:t>
             </a:fld>
             <a:endParaRPr lang="en-IN"/>
           </a:p>
@@ -2356,7 +2358,7 @@
           <a:p>
             <a:fld id="{F221E457-F2B5-4F65-BEE9-1401C8B172CC}" type="datetimeFigureOut">
               <a:rPr lang="en-IN" smtClean="0"/>
-              <a:t>26-01-2023</a:t>
+              <a:t>30-01-2023</a:t>
             </a:fld>
             <a:endParaRPr lang="en-IN"/>
           </a:p>
@@ -2569,7 +2571,7 @@
           <a:p>
             <a:fld id="{F221E457-F2B5-4F65-BEE9-1401C8B172CC}" type="datetimeFigureOut">
               <a:rPr lang="en-IN" smtClean="0"/>
-              <a:t>26-01-2023</a:t>
+              <a:t>30-01-2023</a:t>
             </a:fld>
             <a:endParaRPr lang="en-IN"/>
           </a:p>
@@ -3013,7 +3015,7 @@
         <p:spPr>
           <a:xfrm>
             <a:off x="1076325" y="1019175"/>
-            <a:ext cx="4154663" cy="830997"/>
+            <a:ext cx="4154663" cy="646331"/>
           </a:xfrm>
           <a:prstGeom prst="rect">
             <a:avLst/>
@@ -3056,19 +3058,8 @@
             </a:pPr>
             <a:r>
               <a:rPr lang="en-IN" sz="1200" dirty="0" smtClean="0"/>
-              <a:t>If user is valid Navigate to Main </a:t>
-            </a:r>
-            <a:r>
-              <a:rPr lang="en-IN" sz="1200" dirty="0" smtClean="0"/>
-              <a:t>Menu</a:t>
-            </a:r>
-          </a:p>
-          <a:p>
-            <a:pPr marL="285750" lvl="0" indent="-285750">
-              <a:buFont typeface="Arial" panose="020B0604020202020204" pitchFamily="34" charset="0"/>
-              <a:buChar char="•"/>
-            </a:pPr>
-            <a:endParaRPr lang="en-IN" sz="1200" dirty="0"/>
+              <a:t>If user is valid Navigate to Main Menu</a:t>
+            </a:r>
           </a:p>
         </p:txBody>
       </p:sp>
@@ -3246,7 +3237,7 @@
         <p:spPr>
           <a:xfrm>
             <a:off x="971550" y="1247775"/>
-            <a:ext cx="3233578" cy="1200329"/>
+            <a:ext cx="3579763" cy="1754326"/>
           </a:xfrm>
           <a:prstGeom prst="rect">
             <a:avLst/>
@@ -3306,7 +3297,57 @@
             <a:pPr lvl="0"/>
             <a:r>
               <a:rPr lang="en-IN" sz="1200" dirty="0" smtClean="0"/>
-              <a:t>Login will give access rights to these three  menu</a:t>
+              <a:t>Login will give access rights to these three menu items</a:t>
+            </a:r>
+          </a:p>
+          <a:p>
+            <a:pPr marL="171450" lvl="0" indent="-171450">
+              <a:buFont typeface="Arial" panose="020B0604020202020204" pitchFamily="34" charset="0"/>
+              <a:buChar char="•"/>
+            </a:pPr>
+            <a:r>
+              <a:rPr lang="en-IN" sz="1200" dirty="0" err="1" smtClean="0"/>
+              <a:t>IsDispatchEnable</a:t>
+            </a:r>
+            <a:r>
+              <a:rPr lang="en-IN" sz="1200" dirty="0" smtClean="0"/>
+              <a:t> == true ? Show Dispatch button</a:t>
+            </a:r>
+          </a:p>
+          <a:p>
+            <a:pPr marL="171450" indent="-171450">
+              <a:buFont typeface="Arial" panose="020B0604020202020204" pitchFamily="34" charset="0"/>
+              <a:buChar char="•"/>
+            </a:pPr>
+            <a:r>
+              <a:rPr lang="en-IN" sz="1200" dirty="0" err="1" smtClean="0"/>
+              <a:t>IsEntryEnable</a:t>
+            </a:r>
+            <a:r>
+              <a:rPr lang="en-IN" sz="1200" dirty="0"/>
+              <a:t> == true ? Show </a:t>
+            </a:r>
+            <a:r>
+              <a:rPr lang="en-IN" sz="1200" dirty="0" smtClean="0"/>
+              <a:t>entry button</a:t>
+            </a:r>
+          </a:p>
+          <a:p>
+            <a:pPr marL="171450" indent="-171450">
+              <a:buFont typeface="Arial" panose="020B0604020202020204" pitchFamily="34" charset="0"/>
+              <a:buChar char="•"/>
+            </a:pPr>
+            <a:r>
+              <a:rPr lang="en-IN" sz="1200" dirty="0" err="1" smtClean="0"/>
+              <a:t>IsCountingEnable</a:t>
+            </a:r>
+            <a:r>
+              <a:rPr lang="en-IN" sz="1200" dirty="0"/>
+              <a:t> == true ? Show </a:t>
+            </a:r>
+            <a:r>
+              <a:rPr lang="en-IN" sz="1200" dirty="0" smtClean="0"/>
+              <a:t>counting button</a:t>
             </a:r>
             <a:endParaRPr lang="en-IN" sz="1200" dirty="0"/>
           </a:p>
@@ -5781,6 +5822,1538 @@
       </p:par>
     </p:tnLst>
   </p:timing>
+</p:sld>
+</file>
+
+<file path=ppt/slides/slide7.xml><?xml version="1.0" encoding="utf-8"?>
+<p:sld xmlns:a="http://schemas.openxmlformats.org/drawingml/2006/main" xmlns:r="http://schemas.openxmlformats.org/officeDocument/2006/relationships" xmlns:p="http://schemas.openxmlformats.org/presentationml/2006/main">
+  <p:cSld>
+    <p:spTree>
+      <p:nvGrpSpPr>
+        <p:cNvPr id="1" name=""/>
+        <p:cNvGrpSpPr/>
+        <p:nvPr/>
+      </p:nvGrpSpPr>
+      <p:grpSpPr>
+        <a:xfrm>
+          <a:off x="0" y="0"/>
+          <a:ext cx="0" cy="0"/>
+          <a:chOff x="0" y="0"/>
+          <a:chExt cx="0" cy="0"/>
+        </a:xfrm>
+      </p:grpSpPr>
+      <p:sp>
+        <p:nvSpPr>
+          <p:cNvPr id="4" name="Rectangle 3"/>
+          <p:cNvSpPr/>
+          <p:nvPr/>
+        </p:nvSpPr>
+        <p:spPr>
+          <a:xfrm>
+            <a:off x="1291906" y="302004"/>
+            <a:ext cx="1921078" cy="3196205"/>
+          </a:xfrm>
+          <a:prstGeom prst="rect">
+            <a:avLst/>
+          </a:prstGeom>
+        </p:spPr>
+        <p:style>
+          <a:lnRef idx="2">
+            <a:schemeClr val="accent1">
+              <a:shade val="50000"/>
+            </a:schemeClr>
+          </a:lnRef>
+          <a:fillRef idx="1">
+            <a:schemeClr val="accent1"/>
+          </a:fillRef>
+          <a:effectRef idx="0">
+            <a:schemeClr val="accent1"/>
+          </a:effectRef>
+          <a:fontRef idx="minor">
+            <a:schemeClr val="lt1"/>
+          </a:fontRef>
+        </p:style>
+        <p:txBody>
+          <a:bodyPr rtlCol="0" anchor="ctr"/>
+          <a:lstStyle/>
+          <a:p>
+            <a:pPr marL="0" marR="0" lvl="0" indent="0" algn="ctr" defTabSz="914400" rtl="0" eaLnBrk="1" fontAlgn="auto" latinLnBrk="0" hangingPunct="1">
+              <a:lnSpc>
+                <a:spcPct val="100000"/>
+              </a:lnSpc>
+              <a:spcBef>
+                <a:spcPts val="0"/>
+              </a:spcBef>
+              <a:spcAft>
+                <a:spcPts val="0"/>
+              </a:spcAft>
+              <a:buClrTx/>
+              <a:buSzTx/>
+              <a:buFontTx/>
+              <a:buNone/>
+              <a:tabLst/>
+              <a:defRPr/>
+            </a:pPr>
+            <a:r>
+              <a:rPr kumimoji="0" lang="en-IN" sz="1800" b="0" i="0" u="none" strike="noStrike" kern="1200" cap="none" spc="0" normalizeH="0" baseline="0" noProof="0" dirty="0" smtClean="0">
+                <a:ln>
+                  <a:noFill/>
+                </a:ln>
+                <a:solidFill>
+                  <a:prstClr val="white"/>
+                </a:solidFill>
+                <a:effectLst/>
+                <a:uLnTx/>
+                <a:uFillTx/>
+                <a:latin typeface="Calibri" panose="020F0502020204030204"/>
+                <a:ea typeface="+mn-ea"/>
+                <a:cs typeface="+mn-cs"/>
+              </a:rPr>
+              <a:t>Mobile App</a:t>
+            </a:r>
+          </a:p>
+        </p:txBody>
+      </p:sp>
+      <p:sp>
+        <p:nvSpPr>
+          <p:cNvPr id="5" name="Rectangle 4"/>
+          <p:cNvSpPr/>
+          <p:nvPr/>
+        </p:nvSpPr>
+        <p:spPr>
+          <a:xfrm>
+            <a:off x="5385733" y="302002"/>
+            <a:ext cx="1568742" cy="3196208"/>
+          </a:xfrm>
+          <a:prstGeom prst="rect">
+            <a:avLst/>
+          </a:prstGeom>
+        </p:spPr>
+        <p:style>
+          <a:lnRef idx="2">
+            <a:schemeClr val="accent1">
+              <a:shade val="50000"/>
+            </a:schemeClr>
+          </a:lnRef>
+          <a:fillRef idx="1">
+            <a:schemeClr val="accent1"/>
+          </a:fillRef>
+          <a:effectRef idx="0">
+            <a:schemeClr val="accent1"/>
+          </a:effectRef>
+          <a:fontRef idx="minor">
+            <a:schemeClr val="lt1"/>
+          </a:fontRef>
+        </p:style>
+        <p:txBody>
+          <a:bodyPr rtlCol="0" anchor="ctr"/>
+          <a:lstStyle/>
+          <a:p>
+            <a:pPr marL="0" marR="0" lvl="0" indent="0" algn="ctr" defTabSz="914400" rtl="0" eaLnBrk="1" fontAlgn="auto" latinLnBrk="0" hangingPunct="1">
+              <a:lnSpc>
+                <a:spcPct val="100000"/>
+              </a:lnSpc>
+              <a:spcBef>
+                <a:spcPts val="0"/>
+              </a:spcBef>
+              <a:spcAft>
+                <a:spcPts val="0"/>
+              </a:spcAft>
+              <a:buClrTx/>
+              <a:buSzTx/>
+              <a:buFontTx/>
+              <a:buNone/>
+              <a:tabLst/>
+              <a:defRPr/>
+            </a:pPr>
+            <a:r>
+              <a:rPr kumimoji="0" lang="en-IN" sz="1800" b="0" i="0" u="none" strike="noStrike" kern="1200" cap="none" spc="0" normalizeH="0" baseline="0" noProof="0" dirty="0" smtClean="0">
+                <a:ln>
+                  <a:noFill/>
+                </a:ln>
+                <a:solidFill>
+                  <a:prstClr val="white"/>
+                </a:solidFill>
+                <a:effectLst/>
+                <a:uLnTx/>
+                <a:uFillTx/>
+                <a:latin typeface="Calibri" panose="020F0502020204030204"/>
+                <a:ea typeface="+mn-ea"/>
+                <a:cs typeface="+mn-cs"/>
+              </a:rPr>
+              <a:t>Web API</a:t>
+            </a:r>
+          </a:p>
+        </p:txBody>
+      </p:sp>
+      <p:sp>
+        <p:nvSpPr>
+          <p:cNvPr id="6" name="Rectangle 5"/>
+          <p:cNvSpPr/>
+          <p:nvPr/>
+        </p:nvSpPr>
+        <p:spPr>
+          <a:xfrm>
+            <a:off x="8741331" y="302002"/>
+            <a:ext cx="1963022" cy="3196207"/>
+          </a:xfrm>
+          <a:prstGeom prst="rect">
+            <a:avLst/>
+          </a:prstGeom>
+        </p:spPr>
+        <p:style>
+          <a:lnRef idx="2">
+            <a:schemeClr val="accent1">
+              <a:shade val="50000"/>
+            </a:schemeClr>
+          </a:lnRef>
+          <a:fillRef idx="1">
+            <a:schemeClr val="accent1"/>
+          </a:fillRef>
+          <a:effectRef idx="0">
+            <a:schemeClr val="accent1"/>
+          </a:effectRef>
+          <a:fontRef idx="minor">
+            <a:schemeClr val="lt1"/>
+          </a:fontRef>
+        </p:style>
+        <p:txBody>
+          <a:bodyPr rtlCol="0" anchor="ctr"/>
+          <a:lstStyle/>
+          <a:p>
+            <a:pPr marL="0" marR="0" lvl="0" indent="0" algn="ctr" defTabSz="914400" rtl="0" eaLnBrk="1" fontAlgn="auto" latinLnBrk="0" hangingPunct="1">
+              <a:lnSpc>
+                <a:spcPct val="100000"/>
+              </a:lnSpc>
+              <a:spcBef>
+                <a:spcPts val="0"/>
+              </a:spcBef>
+              <a:spcAft>
+                <a:spcPts val="0"/>
+              </a:spcAft>
+              <a:buClrTx/>
+              <a:buSzTx/>
+              <a:buFontTx/>
+              <a:buNone/>
+              <a:tabLst/>
+              <a:defRPr/>
+            </a:pPr>
+            <a:r>
+              <a:rPr kumimoji="0" lang="en-IN" sz="1800" b="0" i="0" u="none" strike="noStrike" kern="1200" cap="none" spc="0" normalizeH="0" baseline="0" noProof="0" dirty="0" smtClean="0">
+                <a:ln>
+                  <a:noFill/>
+                </a:ln>
+                <a:solidFill>
+                  <a:prstClr val="white"/>
+                </a:solidFill>
+                <a:effectLst/>
+                <a:uLnTx/>
+                <a:uFillTx/>
+                <a:latin typeface="Calibri" panose="020F0502020204030204"/>
+                <a:ea typeface="+mn-ea"/>
+                <a:cs typeface="+mn-cs"/>
+              </a:rPr>
+              <a:t>Cloud Database</a:t>
+            </a:r>
+          </a:p>
+        </p:txBody>
+      </p:sp>
+      <p:cxnSp>
+        <p:nvCxnSpPr>
+          <p:cNvPr id="19" name="Straight Arrow Connector 18"/>
+          <p:cNvCxnSpPr/>
+          <p:nvPr/>
+        </p:nvCxnSpPr>
+        <p:spPr>
+          <a:xfrm flipV="1">
+            <a:off x="3212984" y="1275126"/>
+            <a:ext cx="2172749" cy="25167"/>
+          </a:xfrm>
+          <a:prstGeom prst="straightConnector1">
+            <a:avLst/>
+          </a:prstGeom>
+          <a:ln>
+            <a:tailEnd type="triangle"/>
+          </a:ln>
+        </p:spPr>
+        <p:style>
+          <a:lnRef idx="1">
+            <a:schemeClr val="accent1"/>
+          </a:lnRef>
+          <a:fillRef idx="0">
+            <a:schemeClr val="accent1"/>
+          </a:fillRef>
+          <a:effectRef idx="0">
+            <a:schemeClr val="accent1"/>
+          </a:effectRef>
+          <a:fontRef idx="minor">
+            <a:schemeClr val="tx1"/>
+          </a:fontRef>
+        </p:style>
+      </p:cxnSp>
+      <p:cxnSp>
+        <p:nvCxnSpPr>
+          <p:cNvPr id="21" name="Straight Arrow Connector 20"/>
+          <p:cNvCxnSpPr/>
+          <p:nvPr/>
+        </p:nvCxnSpPr>
+        <p:spPr>
+          <a:xfrm flipV="1">
+            <a:off x="6954475" y="1249959"/>
+            <a:ext cx="1786856" cy="8389"/>
+          </a:xfrm>
+          <a:prstGeom prst="straightConnector1">
+            <a:avLst/>
+          </a:prstGeom>
+          <a:ln>
+            <a:tailEnd type="triangle"/>
+          </a:ln>
+        </p:spPr>
+        <p:style>
+          <a:lnRef idx="1">
+            <a:schemeClr val="accent1"/>
+          </a:lnRef>
+          <a:fillRef idx="0">
+            <a:schemeClr val="accent1"/>
+          </a:fillRef>
+          <a:effectRef idx="0">
+            <a:schemeClr val="accent1"/>
+          </a:effectRef>
+          <a:fontRef idx="minor">
+            <a:schemeClr val="tx1"/>
+          </a:fontRef>
+        </p:style>
+      </p:cxnSp>
+      <p:cxnSp>
+        <p:nvCxnSpPr>
+          <p:cNvPr id="23" name="Straight Arrow Connector 22"/>
+          <p:cNvCxnSpPr/>
+          <p:nvPr/>
+        </p:nvCxnSpPr>
+        <p:spPr>
+          <a:xfrm flipH="1">
+            <a:off x="3212984" y="2719206"/>
+            <a:ext cx="2172749" cy="25167"/>
+          </a:xfrm>
+          <a:prstGeom prst="straightConnector1">
+            <a:avLst/>
+          </a:prstGeom>
+          <a:ln>
+            <a:tailEnd type="triangle"/>
+          </a:ln>
+        </p:spPr>
+        <p:style>
+          <a:lnRef idx="1">
+            <a:schemeClr val="accent1"/>
+          </a:lnRef>
+          <a:fillRef idx="0">
+            <a:schemeClr val="accent1"/>
+          </a:fillRef>
+          <a:effectRef idx="0">
+            <a:schemeClr val="accent1"/>
+          </a:effectRef>
+          <a:fontRef idx="minor">
+            <a:schemeClr val="tx1"/>
+          </a:fontRef>
+        </p:style>
+      </p:cxnSp>
+      <p:cxnSp>
+        <p:nvCxnSpPr>
+          <p:cNvPr id="27" name="Straight Arrow Connector 26"/>
+          <p:cNvCxnSpPr/>
+          <p:nvPr/>
+        </p:nvCxnSpPr>
+        <p:spPr>
+          <a:xfrm flipH="1">
+            <a:off x="6871054" y="2702428"/>
+            <a:ext cx="1786856" cy="16778"/>
+          </a:xfrm>
+          <a:prstGeom prst="straightConnector1">
+            <a:avLst/>
+          </a:prstGeom>
+          <a:ln>
+            <a:tailEnd type="triangle"/>
+          </a:ln>
+        </p:spPr>
+        <p:style>
+          <a:lnRef idx="1">
+            <a:schemeClr val="accent1"/>
+          </a:lnRef>
+          <a:fillRef idx="0">
+            <a:schemeClr val="accent1"/>
+          </a:fillRef>
+          <a:effectRef idx="0">
+            <a:schemeClr val="accent1"/>
+          </a:effectRef>
+          <a:fontRef idx="minor">
+            <a:schemeClr val="tx1"/>
+          </a:fontRef>
+        </p:style>
+      </p:cxnSp>
+      <p:sp>
+        <p:nvSpPr>
+          <p:cNvPr id="28" name="TextBox 27"/>
+          <p:cNvSpPr txBox="1"/>
+          <p:nvPr/>
+        </p:nvSpPr>
+        <p:spPr>
+          <a:xfrm>
+            <a:off x="3837429" y="872347"/>
+            <a:ext cx="777457" cy="307777"/>
+          </a:xfrm>
+          <a:prstGeom prst="rect">
+            <a:avLst/>
+          </a:prstGeom>
+          <a:noFill/>
+        </p:spPr>
+        <p:txBody>
+          <a:bodyPr wrap="none" rtlCol="0">
+            <a:spAutoFit/>
+          </a:bodyPr>
+          <a:lstStyle/>
+          <a:p>
+            <a:pPr marL="0" marR="0" lvl="0" indent="0" algn="l" defTabSz="914400" rtl="0" eaLnBrk="1" fontAlgn="auto" latinLnBrk="0" hangingPunct="1">
+              <a:lnSpc>
+                <a:spcPct val="100000"/>
+              </a:lnSpc>
+              <a:spcBef>
+                <a:spcPts val="0"/>
+              </a:spcBef>
+              <a:spcAft>
+                <a:spcPts val="0"/>
+              </a:spcAft>
+              <a:buClrTx/>
+              <a:buSzTx/>
+              <a:buFontTx/>
+              <a:buNone/>
+              <a:tabLst/>
+              <a:defRPr/>
+            </a:pPr>
+            <a:r>
+              <a:rPr kumimoji="0" lang="en-IN" sz="1400" b="0" i="0" u="none" strike="noStrike" kern="1200" cap="none" spc="0" normalizeH="0" baseline="0" noProof="0" dirty="0" smtClean="0">
+                <a:ln>
+                  <a:noFill/>
+                </a:ln>
+                <a:solidFill>
+                  <a:prstClr val="black"/>
+                </a:solidFill>
+                <a:effectLst/>
+                <a:uLnTx/>
+                <a:uFillTx/>
+                <a:latin typeface="Calibri" panose="020F0502020204030204"/>
+                <a:ea typeface="+mn-ea"/>
+                <a:cs typeface="+mn-cs"/>
+              </a:rPr>
+              <a:t>Request</a:t>
+            </a:r>
+          </a:p>
+        </p:txBody>
+      </p:sp>
+      <p:sp>
+        <p:nvSpPr>
+          <p:cNvPr id="29" name="TextBox 28"/>
+          <p:cNvSpPr txBox="1"/>
+          <p:nvPr/>
+        </p:nvSpPr>
+        <p:spPr>
+          <a:xfrm>
+            <a:off x="7375754" y="872347"/>
+            <a:ext cx="777457" cy="307777"/>
+          </a:xfrm>
+          <a:prstGeom prst="rect">
+            <a:avLst/>
+          </a:prstGeom>
+          <a:noFill/>
+        </p:spPr>
+        <p:txBody>
+          <a:bodyPr wrap="none" rtlCol="0">
+            <a:spAutoFit/>
+          </a:bodyPr>
+          <a:lstStyle/>
+          <a:p>
+            <a:pPr marL="0" marR="0" lvl="0" indent="0" algn="l" defTabSz="914400" rtl="0" eaLnBrk="1" fontAlgn="auto" latinLnBrk="0" hangingPunct="1">
+              <a:lnSpc>
+                <a:spcPct val="100000"/>
+              </a:lnSpc>
+              <a:spcBef>
+                <a:spcPts val="0"/>
+              </a:spcBef>
+              <a:spcAft>
+                <a:spcPts val="0"/>
+              </a:spcAft>
+              <a:buClrTx/>
+              <a:buSzTx/>
+              <a:buFontTx/>
+              <a:buNone/>
+              <a:tabLst/>
+              <a:defRPr/>
+            </a:pPr>
+            <a:r>
+              <a:rPr kumimoji="0" lang="en-IN" sz="1400" b="0" i="0" u="none" strike="noStrike" kern="1200" cap="none" spc="0" normalizeH="0" baseline="0" noProof="0" dirty="0" smtClean="0">
+                <a:ln>
+                  <a:noFill/>
+                </a:ln>
+                <a:solidFill>
+                  <a:prstClr val="black"/>
+                </a:solidFill>
+                <a:effectLst/>
+                <a:uLnTx/>
+                <a:uFillTx/>
+                <a:latin typeface="Calibri" panose="020F0502020204030204"/>
+                <a:ea typeface="+mn-ea"/>
+                <a:cs typeface="+mn-cs"/>
+              </a:rPr>
+              <a:t>Request</a:t>
+            </a:r>
+          </a:p>
+        </p:txBody>
+      </p:sp>
+      <p:sp>
+        <p:nvSpPr>
+          <p:cNvPr id="30" name="TextBox 29"/>
+          <p:cNvSpPr txBox="1"/>
+          <p:nvPr/>
+        </p:nvSpPr>
+        <p:spPr>
+          <a:xfrm>
+            <a:off x="3849628" y="2755322"/>
+            <a:ext cx="883640" cy="307777"/>
+          </a:xfrm>
+          <a:prstGeom prst="rect">
+            <a:avLst/>
+          </a:prstGeom>
+          <a:noFill/>
+        </p:spPr>
+        <p:txBody>
+          <a:bodyPr wrap="none" rtlCol="0">
+            <a:spAutoFit/>
+          </a:bodyPr>
+          <a:lstStyle/>
+          <a:p>
+            <a:pPr marL="0" marR="0" lvl="0" indent="0" algn="l" defTabSz="914400" rtl="0" eaLnBrk="1" fontAlgn="auto" latinLnBrk="0" hangingPunct="1">
+              <a:lnSpc>
+                <a:spcPct val="100000"/>
+              </a:lnSpc>
+              <a:spcBef>
+                <a:spcPts val="0"/>
+              </a:spcBef>
+              <a:spcAft>
+                <a:spcPts val="0"/>
+              </a:spcAft>
+              <a:buClrTx/>
+              <a:buSzTx/>
+              <a:buFontTx/>
+              <a:buNone/>
+              <a:tabLst/>
+              <a:defRPr/>
+            </a:pPr>
+            <a:r>
+              <a:rPr kumimoji="0" lang="en-IN" sz="1400" b="0" i="0" u="none" strike="noStrike" kern="1200" cap="none" spc="0" normalizeH="0" baseline="0" noProof="0" dirty="0" smtClean="0">
+                <a:ln>
+                  <a:noFill/>
+                </a:ln>
+                <a:solidFill>
+                  <a:prstClr val="black"/>
+                </a:solidFill>
+                <a:effectLst/>
+                <a:uLnTx/>
+                <a:uFillTx/>
+                <a:latin typeface="Calibri" panose="020F0502020204030204"/>
+                <a:ea typeface="+mn-ea"/>
+                <a:cs typeface="+mn-cs"/>
+              </a:rPr>
+              <a:t>Response</a:t>
+            </a:r>
+          </a:p>
+        </p:txBody>
+      </p:sp>
+      <p:sp>
+        <p:nvSpPr>
+          <p:cNvPr id="31" name="TextBox 30"/>
+          <p:cNvSpPr txBox="1"/>
+          <p:nvPr/>
+        </p:nvSpPr>
+        <p:spPr>
+          <a:xfrm>
+            <a:off x="7406083" y="2789042"/>
+            <a:ext cx="883640" cy="307777"/>
+          </a:xfrm>
+          <a:prstGeom prst="rect">
+            <a:avLst/>
+          </a:prstGeom>
+          <a:noFill/>
+        </p:spPr>
+        <p:txBody>
+          <a:bodyPr wrap="none" rtlCol="0">
+            <a:spAutoFit/>
+          </a:bodyPr>
+          <a:lstStyle/>
+          <a:p>
+            <a:pPr marL="0" marR="0" lvl="0" indent="0" algn="l" defTabSz="914400" rtl="0" eaLnBrk="1" fontAlgn="auto" latinLnBrk="0" hangingPunct="1">
+              <a:lnSpc>
+                <a:spcPct val="100000"/>
+              </a:lnSpc>
+              <a:spcBef>
+                <a:spcPts val="0"/>
+              </a:spcBef>
+              <a:spcAft>
+                <a:spcPts val="0"/>
+              </a:spcAft>
+              <a:buClrTx/>
+              <a:buSzTx/>
+              <a:buFontTx/>
+              <a:buNone/>
+              <a:tabLst/>
+              <a:defRPr/>
+            </a:pPr>
+            <a:r>
+              <a:rPr kumimoji="0" lang="en-IN" sz="1400" b="0" i="0" u="none" strike="noStrike" kern="1200" cap="none" spc="0" normalizeH="0" baseline="0" noProof="0" dirty="0" smtClean="0">
+                <a:ln>
+                  <a:noFill/>
+                </a:ln>
+                <a:solidFill>
+                  <a:prstClr val="black"/>
+                </a:solidFill>
+                <a:effectLst/>
+                <a:uLnTx/>
+                <a:uFillTx/>
+                <a:latin typeface="Calibri" panose="020F0502020204030204"/>
+                <a:ea typeface="+mn-ea"/>
+                <a:cs typeface="+mn-cs"/>
+              </a:rPr>
+              <a:t>Response</a:t>
+            </a:r>
+          </a:p>
+        </p:txBody>
+      </p:sp>
+      <p:sp>
+        <p:nvSpPr>
+          <p:cNvPr id="32" name="TextBox 31"/>
+          <p:cNvSpPr txBox="1"/>
+          <p:nvPr/>
+        </p:nvSpPr>
+        <p:spPr>
+          <a:xfrm>
+            <a:off x="1208017" y="3712417"/>
+            <a:ext cx="8434425" cy="1754326"/>
+          </a:xfrm>
+          <a:prstGeom prst="rect">
+            <a:avLst/>
+          </a:prstGeom>
+          <a:noFill/>
+        </p:spPr>
+        <p:txBody>
+          <a:bodyPr wrap="none" rtlCol="0">
+            <a:spAutoFit/>
+          </a:bodyPr>
+          <a:lstStyle/>
+          <a:p>
+            <a:pPr marL="0" marR="0" lvl="0" indent="0" algn="l" defTabSz="914400" rtl="0" eaLnBrk="1" fontAlgn="auto" latinLnBrk="0" hangingPunct="1">
+              <a:lnSpc>
+                <a:spcPct val="100000"/>
+              </a:lnSpc>
+              <a:spcBef>
+                <a:spcPts val="0"/>
+              </a:spcBef>
+              <a:spcAft>
+                <a:spcPts val="0"/>
+              </a:spcAft>
+              <a:buClrTx/>
+              <a:buSzTx/>
+              <a:buFontTx/>
+              <a:buNone/>
+              <a:tabLst/>
+              <a:defRPr/>
+            </a:pPr>
+            <a:r>
+              <a:rPr kumimoji="0" lang="en-IN" sz="1200" b="1" i="0" u="none" strike="noStrike" kern="1200" cap="none" spc="0" normalizeH="0" baseline="0" noProof="0" dirty="0" smtClean="0">
+                <a:ln>
+                  <a:noFill/>
+                </a:ln>
+                <a:solidFill>
+                  <a:prstClr val="black"/>
+                </a:solidFill>
+                <a:effectLst/>
+                <a:uLnTx/>
+                <a:uFillTx/>
+                <a:latin typeface="Calibri" panose="020F0502020204030204"/>
+                <a:ea typeface="+mn-ea"/>
+                <a:cs typeface="+mn-cs"/>
+              </a:rPr>
+              <a:t>Few points to be covered</a:t>
+            </a:r>
+          </a:p>
+          <a:p>
+            <a:pPr marL="171450" marR="0" lvl="0" indent="-171450" algn="l" defTabSz="914400" rtl="0" eaLnBrk="1" fontAlgn="auto" latinLnBrk="0" hangingPunct="1">
+              <a:lnSpc>
+                <a:spcPct val="100000"/>
+              </a:lnSpc>
+              <a:spcBef>
+                <a:spcPts val="0"/>
+              </a:spcBef>
+              <a:spcAft>
+                <a:spcPts val="0"/>
+              </a:spcAft>
+              <a:buClrTx/>
+              <a:buSzTx/>
+              <a:buFont typeface="Arial" panose="020B0604020202020204" pitchFamily="34" charset="0"/>
+              <a:buChar char="•"/>
+              <a:tabLst/>
+              <a:defRPr/>
+            </a:pPr>
+            <a:r>
+              <a:rPr kumimoji="0" lang="en-IN" sz="1200" b="0" i="0" u="none" strike="noStrike" kern="1200" cap="none" spc="0" normalizeH="0" baseline="0" noProof="0" dirty="0" smtClean="0">
+                <a:ln>
+                  <a:noFill/>
+                </a:ln>
+                <a:solidFill>
+                  <a:prstClr val="black"/>
+                </a:solidFill>
+                <a:effectLst/>
+                <a:uLnTx/>
+                <a:uFillTx/>
+                <a:latin typeface="Calibri" panose="020F0502020204030204"/>
+                <a:ea typeface="+mn-ea"/>
+                <a:cs typeface="+mn-cs"/>
+              </a:rPr>
+              <a:t>If SKU entered, fetch Item code details.</a:t>
+            </a:r>
+          </a:p>
+          <a:p>
+            <a:pPr marL="171450" marR="0" lvl="0" indent="-171450" algn="l" defTabSz="914400" rtl="0" eaLnBrk="1" fontAlgn="auto" latinLnBrk="0" hangingPunct="1">
+              <a:lnSpc>
+                <a:spcPct val="100000"/>
+              </a:lnSpc>
+              <a:spcBef>
+                <a:spcPts val="0"/>
+              </a:spcBef>
+              <a:spcAft>
+                <a:spcPts val="0"/>
+              </a:spcAft>
+              <a:buClrTx/>
+              <a:buSzTx/>
+              <a:buFont typeface="Arial" panose="020B0604020202020204" pitchFamily="34" charset="0"/>
+              <a:buChar char="•"/>
+              <a:tabLst/>
+              <a:defRPr/>
+            </a:pPr>
+            <a:r>
+              <a:rPr kumimoji="0" lang="en-IN" sz="1200" b="0" i="0" u="none" strike="noStrike" kern="1200" cap="none" spc="0" normalizeH="0" baseline="0" noProof="0" dirty="0" smtClean="0">
+                <a:ln>
+                  <a:noFill/>
+                </a:ln>
+                <a:solidFill>
+                  <a:prstClr val="black"/>
+                </a:solidFill>
+                <a:effectLst/>
+                <a:uLnTx/>
+                <a:uFillTx/>
+                <a:latin typeface="Calibri" panose="020F0502020204030204"/>
+                <a:ea typeface="+mn-ea"/>
+                <a:cs typeface="+mn-cs"/>
+              </a:rPr>
+              <a:t>If Multiple Item codes exists under one SKU, Show message to User.</a:t>
+            </a:r>
+          </a:p>
+          <a:p>
+            <a:pPr marL="171450" marR="0" lvl="0" indent="-171450" algn="l" defTabSz="914400" rtl="0" eaLnBrk="1" fontAlgn="auto" latinLnBrk="0" hangingPunct="1">
+              <a:lnSpc>
+                <a:spcPct val="100000"/>
+              </a:lnSpc>
+              <a:spcBef>
+                <a:spcPts val="0"/>
+              </a:spcBef>
+              <a:spcAft>
+                <a:spcPts val="0"/>
+              </a:spcAft>
+              <a:buClrTx/>
+              <a:buSzTx/>
+              <a:buFont typeface="Arial" panose="020B0604020202020204" pitchFamily="34" charset="0"/>
+              <a:buChar char="•"/>
+              <a:tabLst/>
+              <a:defRPr/>
+            </a:pPr>
+            <a:r>
+              <a:rPr kumimoji="0" lang="en-IN" sz="1200" b="0" i="0" u="none" strike="noStrike" kern="1200" cap="none" spc="0" normalizeH="0" baseline="0" noProof="0" dirty="0" smtClean="0">
+                <a:ln>
+                  <a:noFill/>
+                </a:ln>
+                <a:solidFill>
+                  <a:prstClr val="black"/>
+                </a:solidFill>
+                <a:effectLst/>
+                <a:uLnTx/>
+                <a:uFillTx/>
+                <a:latin typeface="Calibri" panose="020F0502020204030204"/>
+                <a:ea typeface="+mn-ea"/>
+                <a:cs typeface="+mn-cs"/>
+              </a:rPr>
+              <a:t>If Multiple item prices entered under item code, show a dropdown to select one item price, on selecting item price focus quantity.</a:t>
+            </a:r>
+          </a:p>
+          <a:p>
+            <a:pPr marL="171450" marR="0" lvl="0" indent="-171450" algn="l" defTabSz="914400" rtl="0" eaLnBrk="1" fontAlgn="auto" latinLnBrk="0" hangingPunct="1">
+              <a:lnSpc>
+                <a:spcPct val="100000"/>
+              </a:lnSpc>
+              <a:spcBef>
+                <a:spcPts val="0"/>
+              </a:spcBef>
+              <a:spcAft>
+                <a:spcPts val="0"/>
+              </a:spcAft>
+              <a:buClrTx/>
+              <a:buSzTx/>
+              <a:buFont typeface="Arial" panose="020B0604020202020204" pitchFamily="34" charset="0"/>
+              <a:buChar char="•"/>
+              <a:tabLst/>
+              <a:defRPr/>
+            </a:pPr>
+            <a:r>
+              <a:rPr kumimoji="0" lang="en-IN" sz="1200" b="0" i="0" u="none" strike="noStrike" kern="1200" cap="none" spc="0" normalizeH="0" baseline="0" noProof="0" dirty="0" smtClean="0">
+                <a:ln>
+                  <a:noFill/>
+                </a:ln>
+                <a:solidFill>
+                  <a:prstClr val="black"/>
+                </a:solidFill>
+                <a:effectLst/>
+                <a:uLnTx/>
+                <a:uFillTx/>
+                <a:latin typeface="Calibri" panose="020F0502020204030204"/>
+                <a:ea typeface="+mn-ea"/>
+                <a:cs typeface="+mn-cs"/>
+              </a:rPr>
+              <a:t>If only one item price is exists, populate item price directly and keep focus on quantity.</a:t>
+            </a:r>
+          </a:p>
+          <a:p>
+            <a:pPr marL="171450" marR="0" lvl="0" indent="-171450" algn="l" defTabSz="914400" rtl="0" eaLnBrk="1" fontAlgn="auto" latinLnBrk="0" hangingPunct="1">
+              <a:lnSpc>
+                <a:spcPct val="100000"/>
+              </a:lnSpc>
+              <a:spcBef>
+                <a:spcPts val="0"/>
+              </a:spcBef>
+              <a:spcAft>
+                <a:spcPts val="0"/>
+              </a:spcAft>
+              <a:buClrTx/>
+              <a:buSzTx/>
+              <a:buFont typeface="Arial" panose="020B0604020202020204" pitchFamily="34" charset="0"/>
+              <a:buChar char="•"/>
+              <a:tabLst/>
+              <a:defRPr/>
+            </a:pPr>
+            <a:r>
+              <a:rPr kumimoji="0" lang="en-IN" sz="1200" b="0" i="0" u="none" strike="noStrike" kern="1200" cap="none" spc="0" normalizeH="0" baseline="0" noProof="0" dirty="0" smtClean="0">
+                <a:ln>
+                  <a:noFill/>
+                </a:ln>
+                <a:solidFill>
+                  <a:prstClr val="black"/>
+                </a:solidFill>
+                <a:effectLst/>
+                <a:uLnTx/>
+                <a:uFillTx/>
+                <a:latin typeface="Calibri" panose="020F0502020204030204"/>
+                <a:ea typeface="+mn-ea"/>
+                <a:cs typeface="+mn-cs"/>
+              </a:rPr>
+              <a:t>Check item current stock before item dispatch.</a:t>
+            </a:r>
+          </a:p>
+          <a:p>
+            <a:pPr marL="171450" marR="0" lvl="0" indent="-171450" algn="l" defTabSz="914400" rtl="0" eaLnBrk="1" fontAlgn="auto" latinLnBrk="0" hangingPunct="1">
+              <a:lnSpc>
+                <a:spcPct val="100000"/>
+              </a:lnSpc>
+              <a:spcBef>
+                <a:spcPts val="0"/>
+              </a:spcBef>
+              <a:spcAft>
+                <a:spcPts val="0"/>
+              </a:spcAft>
+              <a:buClrTx/>
+              <a:buSzTx/>
+              <a:buFont typeface="Arial" panose="020B0604020202020204" pitchFamily="34" charset="0"/>
+              <a:buChar char="•"/>
+              <a:tabLst/>
+              <a:defRPr/>
+            </a:pPr>
+            <a:r>
+              <a:rPr kumimoji="0" lang="en-IN" sz="1200" b="0" i="0" u="none" strike="noStrike" kern="1200" cap="none" spc="0" normalizeH="0" baseline="0" noProof="0" dirty="0" smtClean="0">
+                <a:ln>
+                  <a:noFill/>
+                </a:ln>
+                <a:solidFill>
+                  <a:prstClr val="black"/>
+                </a:solidFill>
+                <a:effectLst/>
+                <a:uLnTx/>
+                <a:uFillTx/>
+                <a:latin typeface="Calibri" panose="020F0502020204030204"/>
+                <a:ea typeface="+mn-ea"/>
+                <a:cs typeface="+mn-cs"/>
+              </a:rPr>
+              <a:t>Show current stock of warehouse and branch on selecting item code.</a:t>
+            </a:r>
+          </a:p>
+          <a:p>
+            <a:pPr marL="171450" marR="0" lvl="0" indent="-171450" algn="l" defTabSz="914400" rtl="0" eaLnBrk="1" fontAlgn="auto" latinLnBrk="0" hangingPunct="1">
+              <a:lnSpc>
+                <a:spcPct val="100000"/>
+              </a:lnSpc>
+              <a:spcBef>
+                <a:spcPts val="0"/>
+              </a:spcBef>
+              <a:spcAft>
+                <a:spcPts val="0"/>
+              </a:spcAft>
+              <a:buClrTx/>
+              <a:buSzTx/>
+              <a:buFont typeface="Arial" panose="020B0604020202020204" pitchFamily="34" charset="0"/>
+              <a:buChar char="•"/>
+              <a:tabLst/>
+              <a:defRPr/>
+            </a:pPr>
+            <a:r>
+              <a:rPr kumimoji="0" lang="en-IN" sz="1200" b="0" i="0" u="none" strike="noStrike" kern="1200" cap="none" spc="0" normalizeH="0" baseline="0" noProof="0" dirty="0" smtClean="0">
+                <a:ln>
+                  <a:noFill/>
+                </a:ln>
+                <a:solidFill>
+                  <a:prstClr val="black"/>
+                </a:solidFill>
+                <a:effectLst/>
+                <a:uLnTx/>
+                <a:uFillTx/>
+                <a:latin typeface="Calibri" panose="020F0502020204030204"/>
+                <a:ea typeface="+mn-ea"/>
+                <a:cs typeface="+mn-cs"/>
+              </a:rPr>
+              <a:t>If item already exists in list, add new record to existing item</a:t>
+            </a:r>
+          </a:p>
+          <a:p>
+            <a:pPr marL="171450" marR="0" lvl="0" indent="-171450" algn="l" defTabSz="914400" rtl="0" eaLnBrk="1" fontAlgn="auto" latinLnBrk="0" hangingPunct="1">
+              <a:lnSpc>
+                <a:spcPct val="100000"/>
+              </a:lnSpc>
+              <a:spcBef>
+                <a:spcPts val="0"/>
+              </a:spcBef>
+              <a:spcAft>
+                <a:spcPts val="0"/>
+              </a:spcAft>
+              <a:buClrTx/>
+              <a:buSzTx/>
+              <a:buFont typeface="Arial" panose="020B0604020202020204" pitchFamily="34" charset="0"/>
+              <a:buChar char="•"/>
+              <a:tabLst/>
+              <a:defRPr/>
+            </a:pPr>
+            <a:r>
+              <a:rPr kumimoji="0" lang="en-IN" sz="1200" b="0" i="0" u="none" strike="noStrike" kern="1200" cap="none" spc="0" normalizeH="0" baseline="0" noProof="0" dirty="0" smtClean="0">
+                <a:ln>
+                  <a:noFill/>
+                </a:ln>
+                <a:solidFill>
+                  <a:prstClr val="black"/>
+                </a:solidFill>
+                <a:effectLst/>
+                <a:uLnTx/>
+                <a:uFillTx/>
+                <a:latin typeface="Calibri" panose="020F0502020204030204"/>
+                <a:ea typeface="+mn-ea"/>
+                <a:cs typeface="+mn-cs"/>
+              </a:rPr>
+              <a:t>If item already exists with diff tray number in list, cerate a new record.</a:t>
+            </a:r>
+          </a:p>
+        </p:txBody>
+      </p:sp>
+    </p:spTree>
+    <p:extLst>
+      <p:ext uri="{BB962C8B-B14F-4D97-AF65-F5344CB8AC3E}">
+        <p14:creationId xmlns:p14="http://schemas.microsoft.com/office/powerpoint/2010/main" val="1580617147"/>
+      </p:ext>
+    </p:extLst>
+  </p:cSld>
+  <p:clrMapOvr>
+    <a:masterClrMapping/>
+  </p:clrMapOvr>
+</p:sld>
+</file>
+
+<file path=ppt/slides/slide8.xml><?xml version="1.0" encoding="utf-8"?>
+<p:sld xmlns:a="http://schemas.openxmlformats.org/drawingml/2006/main" xmlns:r="http://schemas.openxmlformats.org/officeDocument/2006/relationships" xmlns:p="http://schemas.openxmlformats.org/presentationml/2006/main">
+  <p:cSld>
+    <p:spTree>
+      <p:nvGrpSpPr>
+        <p:cNvPr id="1" name=""/>
+        <p:cNvGrpSpPr/>
+        <p:nvPr/>
+      </p:nvGrpSpPr>
+      <p:grpSpPr>
+        <a:xfrm>
+          <a:off x="0" y="0"/>
+          <a:ext cx="0" cy="0"/>
+          <a:chOff x="0" y="0"/>
+          <a:chExt cx="0" cy="0"/>
+        </a:xfrm>
+      </p:grpSpPr>
+      <p:sp>
+        <p:nvSpPr>
+          <p:cNvPr id="4" name="Rectangle 3"/>
+          <p:cNvSpPr/>
+          <p:nvPr/>
+        </p:nvSpPr>
+        <p:spPr>
+          <a:xfrm>
+            <a:off x="1677800" y="1409348"/>
+            <a:ext cx="1719742" cy="3716323"/>
+          </a:xfrm>
+          <a:prstGeom prst="rect">
+            <a:avLst/>
+          </a:prstGeom>
+        </p:spPr>
+        <p:style>
+          <a:lnRef idx="2">
+            <a:schemeClr val="accent1">
+              <a:shade val="50000"/>
+            </a:schemeClr>
+          </a:lnRef>
+          <a:fillRef idx="1">
+            <a:schemeClr val="accent1"/>
+          </a:fillRef>
+          <a:effectRef idx="0">
+            <a:schemeClr val="accent1"/>
+          </a:effectRef>
+          <a:fontRef idx="minor">
+            <a:schemeClr val="lt1"/>
+          </a:fontRef>
+        </p:style>
+        <p:txBody>
+          <a:bodyPr rtlCol="0" anchor="ctr"/>
+          <a:lstStyle/>
+          <a:p>
+            <a:pPr algn="ctr"/>
+            <a:r>
+              <a:rPr lang="en-IN" dirty="0" smtClean="0"/>
+              <a:t>Cloud Database</a:t>
+            </a:r>
+            <a:endParaRPr lang="en-IN" dirty="0"/>
+          </a:p>
+        </p:txBody>
+      </p:sp>
+      <p:sp>
+        <p:nvSpPr>
+          <p:cNvPr id="5" name="Rectangle 4"/>
+          <p:cNvSpPr/>
+          <p:nvPr/>
+        </p:nvSpPr>
+        <p:spPr>
+          <a:xfrm>
+            <a:off x="4848837" y="1409348"/>
+            <a:ext cx="2147581" cy="3716323"/>
+          </a:xfrm>
+          <a:prstGeom prst="rect">
+            <a:avLst/>
+          </a:prstGeom>
+        </p:spPr>
+        <p:style>
+          <a:lnRef idx="2">
+            <a:schemeClr val="accent1">
+              <a:shade val="50000"/>
+            </a:schemeClr>
+          </a:lnRef>
+          <a:fillRef idx="1">
+            <a:schemeClr val="accent1"/>
+          </a:fillRef>
+          <a:effectRef idx="0">
+            <a:schemeClr val="accent1"/>
+          </a:effectRef>
+          <a:fontRef idx="minor">
+            <a:schemeClr val="lt1"/>
+          </a:fontRef>
+        </p:style>
+        <p:txBody>
+          <a:bodyPr rtlCol="0" anchor="ctr"/>
+          <a:lstStyle/>
+          <a:p>
+            <a:pPr algn="ctr"/>
+            <a:r>
+              <a:rPr lang="en-IN" dirty="0" smtClean="0"/>
+              <a:t>Web Service/</a:t>
+            </a:r>
+          </a:p>
+          <a:p>
+            <a:pPr algn="ctr"/>
+            <a:r>
+              <a:rPr lang="en-IN" dirty="0" smtClean="0"/>
+              <a:t>Windows Service/</a:t>
+            </a:r>
+          </a:p>
+          <a:p>
+            <a:pPr algn="ctr"/>
+            <a:r>
+              <a:rPr lang="en-IN" dirty="0" smtClean="0"/>
+              <a:t>Console Application</a:t>
+            </a:r>
+            <a:endParaRPr lang="en-IN" dirty="0"/>
+          </a:p>
+        </p:txBody>
+      </p:sp>
+      <p:sp>
+        <p:nvSpPr>
+          <p:cNvPr id="10" name="TextBox 9"/>
+          <p:cNvSpPr txBox="1"/>
+          <p:nvPr/>
+        </p:nvSpPr>
+        <p:spPr>
+          <a:xfrm>
+            <a:off x="7028018" y="1284492"/>
+            <a:ext cx="1419695" cy="1277273"/>
+          </a:xfrm>
+          <a:prstGeom prst="rect">
+            <a:avLst/>
+          </a:prstGeom>
+          <a:noFill/>
+        </p:spPr>
+        <p:txBody>
+          <a:bodyPr wrap="square" rtlCol="0">
+            <a:spAutoFit/>
+          </a:bodyPr>
+          <a:lstStyle/>
+          <a:p>
+            <a:r>
+              <a:rPr lang="en-IN" sz="1100" dirty="0" smtClean="0"/>
+              <a:t>Item, Item Code, Item Price</a:t>
+            </a:r>
+          </a:p>
+          <a:p>
+            <a:r>
+              <a:rPr lang="en-IN" sz="1100" dirty="0" smtClean="0"/>
+              <a:t>Item Cost Price, Category,</a:t>
+            </a:r>
+          </a:p>
+          <a:p>
+            <a:r>
+              <a:rPr lang="en-IN" sz="1100" dirty="0" smtClean="0"/>
+              <a:t>Sub Category, Users, </a:t>
+            </a:r>
+          </a:p>
+          <a:p>
+            <a:r>
+              <a:rPr lang="en-IN" sz="1100" dirty="0" smtClean="0"/>
+              <a:t>Roles, Branches, Item Stock</a:t>
+            </a:r>
+            <a:endParaRPr lang="en-IN" sz="1100" dirty="0"/>
+          </a:p>
+        </p:txBody>
+      </p:sp>
+      <p:sp>
+        <p:nvSpPr>
+          <p:cNvPr id="11" name="TextBox 10"/>
+          <p:cNvSpPr txBox="1"/>
+          <p:nvPr/>
+        </p:nvSpPr>
+        <p:spPr>
+          <a:xfrm>
+            <a:off x="7091491" y="4077049"/>
+            <a:ext cx="1440112" cy="600164"/>
+          </a:xfrm>
+          <a:prstGeom prst="rect">
+            <a:avLst/>
+          </a:prstGeom>
+          <a:noFill/>
+        </p:spPr>
+        <p:txBody>
+          <a:bodyPr wrap="square" rtlCol="0">
+            <a:spAutoFit/>
+          </a:bodyPr>
+          <a:lstStyle/>
+          <a:p>
+            <a:r>
+              <a:rPr lang="en-IN" sz="1100" dirty="0" smtClean="0"/>
+              <a:t>Stock Entry, Stock Dispatch, Stock Counting</a:t>
+            </a:r>
+            <a:endParaRPr lang="en-IN" sz="1100" dirty="0"/>
+          </a:p>
+        </p:txBody>
+      </p:sp>
+      <p:sp>
+        <p:nvSpPr>
+          <p:cNvPr id="12" name="TextBox 11"/>
+          <p:cNvSpPr txBox="1"/>
+          <p:nvPr/>
+        </p:nvSpPr>
+        <p:spPr>
+          <a:xfrm>
+            <a:off x="1677800" y="5491289"/>
+            <a:ext cx="8851462" cy="1015663"/>
+          </a:xfrm>
+          <a:prstGeom prst="rect">
+            <a:avLst/>
+          </a:prstGeom>
+          <a:noFill/>
+        </p:spPr>
+        <p:txBody>
+          <a:bodyPr wrap="none" rtlCol="0">
+            <a:spAutoFit/>
+          </a:bodyPr>
+          <a:lstStyle/>
+          <a:p>
+            <a:r>
+              <a:rPr lang="en-IN" sz="1200" b="1" dirty="0" smtClean="0"/>
+              <a:t>Few points to be covered</a:t>
+            </a:r>
+          </a:p>
+          <a:p>
+            <a:pPr marL="171450" indent="-171450">
+              <a:buFont typeface="Arial" panose="020B0604020202020204" pitchFamily="34" charset="0"/>
+              <a:buChar char="•"/>
+            </a:pPr>
+            <a:r>
+              <a:rPr lang="en-IN" sz="1200" dirty="0" smtClean="0"/>
+              <a:t>Warehouse data will be updated in warehouse internal transactions, Periodically data should be updated in cloud for every (5 – 10 </a:t>
+            </a:r>
+            <a:r>
+              <a:rPr lang="en-IN" sz="1200" dirty="0" err="1" smtClean="0"/>
+              <a:t>Mins</a:t>
+            </a:r>
+            <a:r>
+              <a:rPr lang="en-IN" sz="1200" dirty="0" smtClean="0"/>
+              <a:t>)</a:t>
+            </a:r>
+          </a:p>
+          <a:p>
+            <a:pPr marL="171450" indent="-171450">
+              <a:buFont typeface="Arial" panose="020B0604020202020204" pitchFamily="34" charset="0"/>
+              <a:buChar char="•"/>
+            </a:pPr>
+            <a:r>
+              <a:rPr lang="en-IN" sz="1200" dirty="0" smtClean="0"/>
+              <a:t>Stock Entry, stock dispatch, stock counting data should sent warehouse database.</a:t>
+            </a:r>
+          </a:p>
+          <a:p>
+            <a:pPr marL="171450" indent="-171450">
+              <a:buFont typeface="Arial" panose="020B0604020202020204" pitchFamily="34" charset="0"/>
+              <a:buChar char="•"/>
+            </a:pPr>
+            <a:r>
+              <a:rPr lang="en-IN" sz="1200" dirty="0" smtClean="0"/>
+              <a:t>Identify data which is not processed and move to Warehouse</a:t>
+            </a:r>
+          </a:p>
+          <a:p>
+            <a:pPr marL="171450" indent="-171450">
+              <a:buFont typeface="Arial" panose="020B0604020202020204" pitchFamily="34" charset="0"/>
+              <a:buChar char="•"/>
+            </a:pPr>
+            <a:r>
+              <a:rPr lang="en-IN" sz="1200" dirty="0" smtClean="0"/>
+              <a:t>Before inserting data into warehouse database, prepare the data in predefined format.</a:t>
+            </a:r>
+          </a:p>
+        </p:txBody>
+      </p:sp>
+      <p:sp>
+        <p:nvSpPr>
+          <p:cNvPr id="13" name="Rectangle 12"/>
+          <p:cNvSpPr/>
+          <p:nvPr/>
+        </p:nvSpPr>
+        <p:spPr>
+          <a:xfrm>
+            <a:off x="8447713" y="1409348"/>
+            <a:ext cx="1719742" cy="3716323"/>
+          </a:xfrm>
+          <a:prstGeom prst="rect">
+            <a:avLst/>
+          </a:prstGeom>
+        </p:spPr>
+        <p:style>
+          <a:lnRef idx="2">
+            <a:schemeClr val="accent1">
+              <a:shade val="50000"/>
+            </a:schemeClr>
+          </a:lnRef>
+          <a:fillRef idx="1">
+            <a:schemeClr val="accent1"/>
+          </a:fillRef>
+          <a:effectRef idx="0">
+            <a:schemeClr val="accent1"/>
+          </a:effectRef>
+          <a:fontRef idx="minor">
+            <a:schemeClr val="lt1"/>
+          </a:fontRef>
+        </p:style>
+        <p:txBody>
+          <a:bodyPr rtlCol="0" anchor="ctr"/>
+          <a:lstStyle/>
+          <a:p>
+            <a:pPr algn="ctr"/>
+            <a:r>
+              <a:rPr lang="en-IN" dirty="0" smtClean="0"/>
+              <a:t>Cloud Database</a:t>
+            </a:r>
+            <a:endParaRPr lang="en-IN" dirty="0"/>
+          </a:p>
+        </p:txBody>
+      </p:sp>
+      <p:cxnSp>
+        <p:nvCxnSpPr>
+          <p:cNvPr id="21" name="Straight Arrow Connector 20"/>
+          <p:cNvCxnSpPr/>
+          <p:nvPr/>
+        </p:nvCxnSpPr>
+        <p:spPr>
+          <a:xfrm flipH="1">
+            <a:off x="6996418" y="2491530"/>
+            <a:ext cx="1451295" cy="0"/>
+          </a:xfrm>
+          <a:prstGeom prst="straightConnector1">
+            <a:avLst/>
+          </a:prstGeom>
+          <a:ln>
+            <a:tailEnd type="triangle"/>
+          </a:ln>
+        </p:spPr>
+        <p:style>
+          <a:lnRef idx="1">
+            <a:schemeClr val="accent1"/>
+          </a:lnRef>
+          <a:fillRef idx="0">
+            <a:schemeClr val="accent1"/>
+          </a:fillRef>
+          <a:effectRef idx="0">
+            <a:schemeClr val="accent1"/>
+          </a:effectRef>
+          <a:fontRef idx="minor">
+            <a:schemeClr val="tx1"/>
+          </a:fontRef>
+        </p:style>
+      </p:cxnSp>
+      <p:cxnSp>
+        <p:nvCxnSpPr>
+          <p:cNvPr id="23" name="Straight Arrow Connector 22"/>
+          <p:cNvCxnSpPr/>
+          <p:nvPr/>
+        </p:nvCxnSpPr>
+        <p:spPr>
+          <a:xfrm flipH="1">
+            <a:off x="3397542" y="2432807"/>
+            <a:ext cx="1451295" cy="16778"/>
+          </a:xfrm>
+          <a:prstGeom prst="straightConnector1">
+            <a:avLst/>
+          </a:prstGeom>
+          <a:ln>
+            <a:tailEnd type="triangle"/>
+          </a:ln>
+        </p:spPr>
+        <p:style>
+          <a:lnRef idx="1">
+            <a:schemeClr val="accent1"/>
+          </a:lnRef>
+          <a:fillRef idx="0">
+            <a:schemeClr val="accent1"/>
+          </a:fillRef>
+          <a:effectRef idx="0">
+            <a:schemeClr val="accent1"/>
+          </a:effectRef>
+          <a:fontRef idx="minor">
+            <a:schemeClr val="tx1"/>
+          </a:fontRef>
+        </p:style>
+      </p:cxnSp>
+      <p:cxnSp>
+        <p:nvCxnSpPr>
+          <p:cNvPr id="25" name="Straight Arrow Connector 24"/>
+          <p:cNvCxnSpPr/>
+          <p:nvPr/>
+        </p:nvCxnSpPr>
+        <p:spPr>
+          <a:xfrm>
+            <a:off x="3397542" y="4060272"/>
+            <a:ext cx="1451295" cy="16777"/>
+          </a:xfrm>
+          <a:prstGeom prst="straightConnector1">
+            <a:avLst/>
+          </a:prstGeom>
+          <a:ln>
+            <a:tailEnd type="triangle"/>
+          </a:ln>
+        </p:spPr>
+        <p:style>
+          <a:lnRef idx="1">
+            <a:schemeClr val="accent1"/>
+          </a:lnRef>
+          <a:fillRef idx="0">
+            <a:schemeClr val="accent1"/>
+          </a:fillRef>
+          <a:effectRef idx="0">
+            <a:schemeClr val="accent1"/>
+          </a:effectRef>
+          <a:fontRef idx="minor">
+            <a:schemeClr val="tx1"/>
+          </a:fontRef>
+        </p:style>
+      </p:cxnSp>
+      <p:cxnSp>
+        <p:nvCxnSpPr>
+          <p:cNvPr id="27" name="Straight Arrow Connector 26"/>
+          <p:cNvCxnSpPr/>
+          <p:nvPr/>
+        </p:nvCxnSpPr>
+        <p:spPr>
+          <a:xfrm flipV="1">
+            <a:off x="6996418" y="3993160"/>
+            <a:ext cx="1451295" cy="8390"/>
+          </a:xfrm>
+          <a:prstGeom prst="straightConnector1">
+            <a:avLst/>
+          </a:prstGeom>
+          <a:ln>
+            <a:tailEnd type="triangle"/>
+          </a:ln>
+        </p:spPr>
+        <p:style>
+          <a:lnRef idx="1">
+            <a:schemeClr val="accent1"/>
+          </a:lnRef>
+          <a:fillRef idx="0">
+            <a:schemeClr val="accent1"/>
+          </a:fillRef>
+          <a:effectRef idx="0">
+            <a:schemeClr val="accent1"/>
+          </a:effectRef>
+          <a:fontRef idx="minor">
+            <a:schemeClr val="tx1"/>
+          </a:fontRef>
+        </p:style>
+      </p:cxnSp>
+      <p:sp>
+        <p:nvSpPr>
+          <p:cNvPr id="30" name="TextBox 29"/>
+          <p:cNvSpPr txBox="1"/>
+          <p:nvPr/>
+        </p:nvSpPr>
+        <p:spPr>
+          <a:xfrm>
+            <a:off x="3350005" y="1250159"/>
+            <a:ext cx="1525398" cy="1277273"/>
+          </a:xfrm>
+          <a:prstGeom prst="rect">
+            <a:avLst/>
+          </a:prstGeom>
+          <a:noFill/>
+        </p:spPr>
+        <p:txBody>
+          <a:bodyPr wrap="square" rtlCol="0">
+            <a:spAutoFit/>
+          </a:bodyPr>
+          <a:lstStyle/>
+          <a:p>
+            <a:r>
+              <a:rPr lang="en-IN" sz="1100" dirty="0" smtClean="0"/>
+              <a:t>Item, Item Code, Item Price</a:t>
+            </a:r>
+          </a:p>
+          <a:p>
+            <a:r>
+              <a:rPr lang="en-IN" sz="1100" dirty="0" smtClean="0"/>
+              <a:t>Item Cost Price, Category,</a:t>
+            </a:r>
+          </a:p>
+          <a:p>
+            <a:r>
+              <a:rPr lang="en-IN" sz="1100" dirty="0" smtClean="0"/>
+              <a:t>Sub Category, Users, </a:t>
+            </a:r>
+          </a:p>
+          <a:p>
+            <a:r>
+              <a:rPr lang="en-IN" sz="1100" dirty="0" smtClean="0"/>
+              <a:t>Roles, Branches, Item Stock</a:t>
+            </a:r>
+            <a:endParaRPr lang="en-IN" sz="1100" dirty="0"/>
+          </a:p>
+        </p:txBody>
+      </p:sp>
+      <p:sp>
+        <p:nvSpPr>
+          <p:cNvPr id="31" name="TextBox 30"/>
+          <p:cNvSpPr txBox="1"/>
+          <p:nvPr/>
+        </p:nvSpPr>
+        <p:spPr>
+          <a:xfrm>
+            <a:off x="3397542" y="4164646"/>
+            <a:ext cx="1430325" cy="600164"/>
+          </a:xfrm>
+          <a:prstGeom prst="rect">
+            <a:avLst/>
+          </a:prstGeom>
+          <a:noFill/>
+        </p:spPr>
+        <p:txBody>
+          <a:bodyPr wrap="square" rtlCol="0">
+            <a:spAutoFit/>
+          </a:bodyPr>
+          <a:lstStyle/>
+          <a:p>
+            <a:r>
+              <a:rPr lang="en-IN" sz="1100" dirty="0" smtClean="0"/>
+              <a:t>Stock Entry, Stock Dispatch, Stock Counting</a:t>
+            </a:r>
+            <a:endParaRPr lang="en-IN" sz="1100" dirty="0"/>
+          </a:p>
+        </p:txBody>
+      </p:sp>
+      <p:sp>
+        <p:nvSpPr>
+          <p:cNvPr id="32" name="TextBox 31"/>
+          <p:cNvSpPr txBox="1"/>
+          <p:nvPr/>
+        </p:nvSpPr>
+        <p:spPr>
+          <a:xfrm>
+            <a:off x="1325461" y="385894"/>
+            <a:ext cx="2498120" cy="400110"/>
+          </a:xfrm>
+          <a:prstGeom prst="rect">
+            <a:avLst/>
+          </a:prstGeom>
+          <a:noFill/>
+        </p:spPr>
+        <p:txBody>
+          <a:bodyPr wrap="none" rtlCol="0">
+            <a:spAutoFit/>
+          </a:bodyPr>
+          <a:lstStyle/>
+          <a:p>
+            <a:r>
+              <a:rPr lang="en-IN" sz="2000" b="1" dirty="0" smtClean="0"/>
+              <a:t>Data Synchronization </a:t>
+            </a:r>
+            <a:endParaRPr lang="en-IN" sz="2000" b="1" dirty="0"/>
+          </a:p>
+        </p:txBody>
+      </p:sp>
+    </p:spTree>
+    <p:extLst>
+      <p:ext uri="{BB962C8B-B14F-4D97-AF65-F5344CB8AC3E}">
+        <p14:creationId xmlns:p14="http://schemas.microsoft.com/office/powerpoint/2010/main" val="339324075"/>
+      </p:ext>
+    </p:extLst>
+  </p:cSld>
+  <p:clrMapOvr>
+    <a:masterClrMapping/>
+  </p:clrMapOvr>
 </p:sld>
 </file>
 

</xml_diff>

<commit_message>
Changes for folders and namespaces
Changes for folders and namespaces
</commit_message>
<xml_diff>
--- a/Requirements/NSRetail_Mobile_Requirements.pptx
+++ b/Requirements/NSRetail_Mobile_Requirements.pptx
@@ -10,9 +10,10 @@
     <p:sldId id="256" r:id="rId4"/>
     <p:sldId id="260" r:id="rId5"/>
     <p:sldId id="262" r:id="rId6"/>
-    <p:sldId id="257" r:id="rId7"/>
-    <p:sldId id="264" r:id="rId8"/>
-    <p:sldId id="265" r:id="rId9"/>
+    <p:sldId id="266" r:id="rId7"/>
+    <p:sldId id="257" r:id="rId8"/>
+    <p:sldId id="264" r:id="rId9"/>
+    <p:sldId id="265" r:id="rId10"/>
   </p:sldIdLst>
   <p:sldSz cx="12192000" cy="6858000"/>
   <p:notesSz cx="6858000" cy="9144000"/>
@@ -250,7 +251,7 @@
           <a:p>
             <a:fld id="{F221E457-F2B5-4F65-BEE9-1401C8B172CC}" type="datetimeFigureOut">
               <a:rPr lang="en-IN" smtClean="0"/>
-              <a:t>30-01-2023</a:t>
+              <a:t>08-02-2023</a:t>
             </a:fld>
             <a:endParaRPr lang="en-IN"/>
           </a:p>
@@ -420,7 +421,7 @@
           <a:p>
             <a:fld id="{F221E457-F2B5-4F65-BEE9-1401C8B172CC}" type="datetimeFigureOut">
               <a:rPr lang="en-IN" smtClean="0"/>
-              <a:t>30-01-2023</a:t>
+              <a:t>08-02-2023</a:t>
             </a:fld>
             <a:endParaRPr lang="en-IN"/>
           </a:p>
@@ -600,7 +601,7 @@
           <a:p>
             <a:fld id="{F221E457-F2B5-4F65-BEE9-1401C8B172CC}" type="datetimeFigureOut">
               <a:rPr lang="en-IN" smtClean="0"/>
-              <a:t>30-01-2023</a:t>
+              <a:t>08-02-2023</a:t>
             </a:fld>
             <a:endParaRPr lang="en-IN"/>
           </a:p>
@@ -770,7 +771,7 @@
           <a:p>
             <a:fld id="{F221E457-F2B5-4F65-BEE9-1401C8B172CC}" type="datetimeFigureOut">
               <a:rPr lang="en-IN" smtClean="0"/>
-              <a:t>30-01-2023</a:t>
+              <a:t>08-02-2023</a:t>
             </a:fld>
             <a:endParaRPr lang="en-IN"/>
           </a:p>
@@ -1016,7 +1017,7 @@
           <a:p>
             <a:fld id="{F221E457-F2B5-4F65-BEE9-1401C8B172CC}" type="datetimeFigureOut">
               <a:rPr lang="en-IN" smtClean="0"/>
-              <a:t>30-01-2023</a:t>
+              <a:t>08-02-2023</a:t>
             </a:fld>
             <a:endParaRPr lang="en-IN"/>
           </a:p>
@@ -1248,7 +1249,7 @@
           <a:p>
             <a:fld id="{F221E457-F2B5-4F65-BEE9-1401C8B172CC}" type="datetimeFigureOut">
               <a:rPr lang="en-IN" smtClean="0"/>
-              <a:t>30-01-2023</a:t>
+              <a:t>08-02-2023</a:t>
             </a:fld>
             <a:endParaRPr lang="en-IN"/>
           </a:p>
@@ -1615,7 +1616,7 @@
           <a:p>
             <a:fld id="{F221E457-F2B5-4F65-BEE9-1401C8B172CC}" type="datetimeFigureOut">
               <a:rPr lang="en-IN" smtClean="0"/>
-              <a:t>30-01-2023</a:t>
+              <a:t>08-02-2023</a:t>
             </a:fld>
             <a:endParaRPr lang="en-IN"/>
           </a:p>
@@ -1733,7 +1734,7 @@
           <a:p>
             <a:fld id="{F221E457-F2B5-4F65-BEE9-1401C8B172CC}" type="datetimeFigureOut">
               <a:rPr lang="en-IN" smtClean="0"/>
-              <a:t>30-01-2023</a:t>
+              <a:t>08-02-2023</a:t>
             </a:fld>
             <a:endParaRPr lang="en-IN"/>
           </a:p>
@@ -1828,7 +1829,7 @@
           <a:p>
             <a:fld id="{F221E457-F2B5-4F65-BEE9-1401C8B172CC}" type="datetimeFigureOut">
               <a:rPr lang="en-IN" smtClean="0"/>
-              <a:t>30-01-2023</a:t>
+              <a:t>08-02-2023</a:t>
             </a:fld>
             <a:endParaRPr lang="en-IN"/>
           </a:p>
@@ -2105,7 +2106,7 @@
           <a:p>
             <a:fld id="{F221E457-F2B5-4F65-BEE9-1401C8B172CC}" type="datetimeFigureOut">
               <a:rPr lang="en-IN" smtClean="0"/>
-              <a:t>30-01-2023</a:t>
+              <a:t>08-02-2023</a:t>
             </a:fld>
             <a:endParaRPr lang="en-IN"/>
           </a:p>
@@ -2358,7 +2359,7 @@
           <a:p>
             <a:fld id="{F221E457-F2B5-4F65-BEE9-1401C8B172CC}" type="datetimeFigureOut">
               <a:rPr lang="en-IN" smtClean="0"/>
-              <a:t>30-01-2023</a:t>
+              <a:t>08-02-2023</a:t>
             </a:fld>
             <a:endParaRPr lang="en-IN"/>
           </a:p>
@@ -2571,7 +2572,7 @@
           <a:p>
             <a:fld id="{F221E457-F2B5-4F65-BEE9-1401C8B172CC}" type="datetimeFigureOut">
               <a:rPr lang="en-IN" smtClean="0"/>
-              <a:t>30-01-2023</a:t>
+              <a:t>08-02-2023</a:t>
             </a:fld>
             <a:endParaRPr lang="en-IN"/>
           </a:p>
@@ -3215,8 +3216,8 @@
         </p:blipFill>
         <p:spPr>
           <a:xfrm>
-            <a:off x="5804535" y="887373"/>
-            <a:ext cx="3592830" cy="3336290"/>
+            <a:off x="5762590" y="746641"/>
+            <a:ext cx="3592830" cy="4873983"/>
           </a:xfrm>
           <a:prstGeom prst="rect">
             <a:avLst/>
@@ -3237,7 +3238,7 @@
         <p:spPr>
           <a:xfrm>
             <a:off x="971550" y="1247775"/>
-            <a:ext cx="3579763" cy="1754326"/>
+            <a:ext cx="3579763" cy="1938992"/>
           </a:xfrm>
           <a:prstGeom prst="rect">
             <a:avLst/>
@@ -3290,6 +3291,17 @@
             </a:r>
           </a:p>
           <a:p>
+            <a:pPr marL="285750" lvl="0" indent="-285750">
+              <a:buFont typeface="Arial" panose="020B0604020202020204" pitchFamily="34" charset="0"/>
+              <a:buChar char="•"/>
+            </a:pPr>
+            <a:r>
+              <a:rPr lang="en-IN" sz="1200" dirty="0" smtClean="0"/>
+              <a:t>Item Details</a:t>
+            </a:r>
+            <a:endParaRPr lang="en-IN" sz="1200" dirty="0" smtClean="0"/>
+          </a:p>
+          <a:p>
             <a:pPr lvl="0"/>
             <a:endParaRPr lang="en-IN" sz="1200" dirty="0"/>
           </a:p>
@@ -3361,7 +3373,7 @@
         </p:nvSpPr>
         <p:spPr>
           <a:xfrm>
-            <a:off x="6761527" y="3531765"/>
+            <a:off x="6761527" y="4335032"/>
             <a:ext cx="1954634" cy="310393"/>
           </a:xfrm>
           <a:prstGeom prst="rect">
@@ -3405,7 +3417,7 @@
         </p:nvSpPr>
         <p:spPr>
           <a:xfrm>
-            <a:off x="6761527" y="3877714"/>
+            <a:off x="6761527" y="4768103"/>
             <a:ext cx="1954634" cy="310393"/>
           </a:xfrm>
           <a:prstGeom prst="rect">
@@ -3489,6 +3501,49 @@
               <a:t>Logout button and App version</a:t>
             </a:r>
             <a:endParaRPr lang="en-IN" sz="1400" dirty="0"/>
+          </a:p>
+        </p:txBody>
+      </p:sp>
+      <p:sp>
+        <p:nvSpPr>
+          <p:cNvPr id="9" name="Rectangle 8"/>
+          <p:cNvSpPr/>
+          <p:nvPr/>
+        </p:nvSpPr>
+        <p:spPr>
+          <a:xfrm>
+            <a:off x="6761527" y="5216374"/>
+            <a:ext cx="1954634" cy="310393"/>
+          </a:xfrm>
+          <a:prstGeom prst="rect">
+            <a:avLst/>
+          </a:prstGeom>
+        </p:spPr>
+        <p:style>
+          <a:lnRef idx="2">
+            <a:schemeClr val="accent1">
+              <a:shade val="50000"/>
+            </a:schemeClr>
+          </a:lnRef>
+          <a:fillRef idx="1">
+            <a:schemeClr val="accent1"/>
+          </a:fillRef>
+          <a:effectRef idx="0">
+            <a:schemeClr val="accent1"/>
+          </a:effectRef>
+          <a:fontRef idx="minor">
+            <a:schemeClr val="lt1"/>
+          </a:fontRef>
+        </p:style>
+        <p:txBody>
+          <a:bodyPr rtlCol="0" anchor="ctr"/>
+          <a:lstStyle/>
+          <a:p>
+            <a:pPr algn="ctr"/>
+            <a:r>
+              <a:rPr lang="en-IN" dirty="0" smtClean="0"/>
+              <a:t>Item Details</a:t>
+            </a:r>
           </a:p>
         </p:txBody>
       </p:sp>
@@ -5548,6 +5603,110 @@
           <a:chExt cx="0" cy="0"/>
         </a:xfrm>
       </p:grpSpPr>
+      <p:sp>
+        <p:nvSpPr>
+          <p:cNvPr id="4" name="TextBox 3"/>
+          <p:cNvSpPr txBox="1"/>
+          <p:nvPr/>
+        </p:nvSpPr>
+        <p:spPr>
+          <a:xfrm>
+            <a:off x="1317072" y="713064"/>
+            <a:ext cx="1306640" cy="369332"/>
+          </a:xfrm>
+          <a:prstGeom prst="rect">
+            <a:avLst/>
+          </a:prstGeom>
+          <a:noFill/>
+        </p:spPr>
+        <p:txBody>
+          <a:bodyPr wrap="none" rtlCol="0">
+            <a:spAutoFit/>
+          </a:bodyPr>
+          <a:lstStyle/>
+          <a:p>
+            <a:r>
+              <a:rPr lang="en-IN" dirty="0" smtClean="0"/>
+              <a:t>Item Details</a:t>
+            </a:r>
+            <a:endParaRPr lang="en-IN" dirty="0"/>
+          </a:p>
+        </p:txBody>
+      </p:sp>
+      <p:sp>
+        <p:nvSpPr>
+          <p:cNvPr id="5" name="TextBox 4"/>
+          <p:cNvSpPr txBox="1"/>
+          <p:nvPr/>
+        </p:nvSpPr>
+        <p:spPr>
+          <a:xfrm>
+            <a:off x="1317072" y="1879134"/>
+            <a:ext cx="2128981" cy="646331"/>
+          </a:xfrm>
+          <a:prstGeom prst="rect">
+            <a:avLst/>
+          </a:prstGeom>
+          <a:noFill/>
+        </p:spPr>
+        <p:txBody>
+          <a:bodyPr wrap="none" rtlCol="0">
+            <a:spAutoFit/>
+          </a:bodyPr>
+          <a:lstStyle/>
+          <a:p>
+            <a:pPr marL="285750" indent="-285750">
+              <a:buFont typeface="Arial" panose="020B0604020202020204" pitchFamily="34" charset="0"/>
+              <a:buChar char="•"/>
+            </a:pPr>
+            <a:r>
+              <a:rPr lang="en-IN" dirty="0" smtClean="0"/>
+              <a:t>Show Item Stock</a:t>
+            </a:r>
+          </a:p>
+          <a:p>
+            <a:pPr marL="285750" indent="-285750">
+              <a:buFont typeface="Arial" panose="020B0604020202020204" pitchFamily="34" charset="0"/>
+              <a:buChar char="•"/>
+            </a:pPr>
+            <a:r>
+              <a:rPr lang="en-IN" dirty="0" smtClean="0"/>
+              <a:t>Item Offer Details</a:t>
+            </a:r>
+            <a:endParaRPr lang="en-IN" dirty="0"/>
+          </a:p>
+        </p:txBody>
+      </p:sp>
+    </p:spTree>
+    <p:extLst>
+      <p:ext uri="{BB962C8B-B14F-4D97-AF65-F5344CB8AC3E}">
+        <p14:creationId xmlns:p14="http://schemas.microsoft.com/office/powerpoint/2010/main" val="1103084142"/>
+      </p:ext>
+    </p:extLst>
+  </p:cSld>
+  <p:clrMapOvr>
+    <a:masterClrMapping/>
+  </p:clrMapOvr>
+</p:sld>
+</file>
+
+<file path=ppt/slides/slide7.xml><?xml version="1.0" encoding="utf-8"?>
+<p:sld xmlns:a="http://schemas.openxmlformats.org/drawingml/2006/main" xmlns:r="http://schemas.openxmlformats.org/officeDocument/2006/relationships" xmlns:p="http://schemas.openxmlformats.org/presentationml/2006/main">
+  <p:cSld>
+    <p:spTree>
+      <p:nvGrpSpPr>
+        <p:cNvPr id="1" name=""/>
+        <p:cNvGrpSpPr/>
+        <p:nvPr/>
+      </p:nvGrpSpPr>
+      <p:grpSpPr>
+        <a:xfrm>
+          <a:off x="0" y="0"/>
+          <a:ext cx="0" cy="0"/>
+          <a:chOff x="0" y="0"/>
+          <a:chExt cx="0" cy="0"/>
+        </a:xfrm>
+      </p:grpSpPr>
       <p:pic>
         <p:nvPicPr>
           <p:cNvPr id="4" name="Picture 3"/>
@@ -5825,7 +5984,7 @@
 </p:sld>
 </file>
 
-<file path=ppt/slides/slide7.xml><?xml version="1.0" encoding="utf-8"?>
+<file path=ppt/slides/slide8.xml><?xml version="1.0" encoding="utf-8"?>
 <p:sld xmlns:a="http://schemas.openxmlformats.org/drawingml/2006/main" xmlns:r="http://schemas.openxmlformats.org/officeDocument/2006/relationships" xmlns:p="http://schemas.openxmlformats.org/presentationml/2006/main">
   <p:cSld>
     <p:spTree>
@@ -6786,7 +6945,7 @@
 </p:sld>
 </file>
 
-<file path=ppt/slides/slide8.xml><?xml version="1.0" encoding="utf-8"?>
+<file path=ppt/slides/slide9.xml><?xml version="1.0" encoding="utf-8"?>
 <p:sld xmlns:a="http://schemas.openxmlformats.org/drawingml/2006/main" xmlns:r="http://schemas.openxmlformats.org/officeDocument/2006/relationships" xmlns:p="http://schemas.openxmlformats.org/presentationml/2006/main">
   <p:cSld>
     <p:spTree>
@@ -7098,7 +7257,7 @@
             <a:pPr algn="ctr"/>
             <a:r>
               <a:rPr lang="en-IN" dirty="0" smtClean="0"/>
-              <a:t>Cloud Database</a:t>
+              <a:t>Warehouse Database</a:t>
             </a:r>
             <a:endParaRPr lang="en-IN" dirty="0"/>
           </a:p>

</xml_diff>

<commit_message>
Changes for stock adjustments
Changes for stock adjustments
</commit_message>
<xml_diff>
--- a/Requirements/NSRetail_Mobile_Requirements.pptx
+++ b/Requirements/NSRetail_Mobile_Requirements.pptx
@@ -253,7 +253,7 @@
           <a:p>
             <a:fld id="{F221E457-F2B5-4F65-BEE9-1401C8B172CC}" type="datetimeFigureOut">
               <a:rPr lang="en-IN" smtClean="0"/>
-              <a:t>26-02-2023</a:t>
+              <a:t>20-05-2023</a:t>
             </a:fld>
             <a:endParaRPr lang="en-IN"/>
           </a:p>
@@ -423,7 +423,7 @@
           <a:p>
             <a:fld id="{F221E457-F2B5-4F65-BEE9-1401C8B172CC}" type="datetimeFigureOut">
               <a:rPr lang="en-IN" smtClean="0"/>
-              <a:t>26-02-2023</a:t>
+              <a:t>20-05-2023</a:t>
             </a:fld>
             <a:endParaRPr lang="en-IN"/>
           </a:p>
@@ -603,7 +603,7 @@
           <a:p>
             <a:fld id="{F221E457-F2B5-4F65-BEE9-1401C8B172CC}" type="datetimeFigureOut">
               <a:rPr lang="en-IN" smtClean="0"/>
-              <a:t>26-02-2023</a:t>
+              <a:t>20-05-2023</a:t>
             </a:fld>
             <a:endParaRPr lang="en-IN"/>
           </a:p>
@@ -773,7 +773,7 @@
           <a:p>
             <a:fld id="{F221E457-F2B5-4F65-BEE9-1401C8B172CC}" type="datetimeFigureOut">
               <a:rPr lang="en-IN" smtClean="0"/>
-              <a:t>26-02-2023</a:t>
+              <a:t>20-05-2023</a:t>
             </a:fld>
             <a:endParaRPr lang="en-IN"/>
           </a:p>
@@ -1019,7 +1019,7 @@
           <a:p>
             <a:fld id="{F221E457-F2B5-4F65-BEE9-1401C8B172CC}" type="datetimeFigureOut">
               <a:rPr lang="en-IN" smtClean="0"/>
-              <a:t>26-02-2023</a:t>
+              <a:t>20-05-2023</a:t>
             </a:fld>
             <a:endParaRPr lang="en-IN"/>
           </a:p>
@@ -1251,7 +1251,7 @@
           <a:p>
             <a:fld id="{F221E457-F2B5-4F65-BEE9-1401C8B172CC}" type="datetimeFigureOut">
               <a:rPr lang="en-IN" smtClean="0"/>
-              <a:t>26-02-2023</a:t>
+              <a:t>20-05-2023</a:t>
             </a:fld>
             <a:endParaRPr lang="en-IN"/>
           </a:p>
@@ -1618,7 +1618,7 @@
           <a:p>
             <a:fld id="{F221E457-F2B5-4F65-BEE9-1401C8B172CC}" type="datetimeFigureOut">
               <a:rPr lang="en-IN" smtClean="0"/>
-              <a:t>26-02-2023</a:t>
+              <a:t>20-05-2023</a:t>
             </a:fld>
             <a:endParaRPr lang="en-IN"/>
           </a:p>
@@ -1736,7 +1736,7 @@
           <a:p>
             <a:fld id="{F221E457-F2B5-4F65-BEE9-1401C8B172CC}" type="datetimeFigureOut">
               <a:rPr lang="en-IN" smtClean="0"/>
-              <a:t>26-02-2023</a:t>
+              <a:t>20-05-2023</a:t>
             </a:fld>
             <a:endParaRPr lang="en-IN"/>
           </a:p>
@@ -1831,7 +1831,7 @@
           <a:p>
             <a:fld id="{F221E457-F2B5-4F65-BEE9-1401C8B172CC}" type="datetimeFigureOut">
               <a:rPr lang="en-IN" smtClean="0"/>
-              <a:t>26-02-2023</a:t>
+              <a:t>20-05-2023</a:t>
             </a:fld>
             <a:endParaRPr lang="en-IN"/>
           </a:p>
@@ -2108,7 +2108,7 @@
           <a:p>
             <a:fld id="{F221E457-F2B5-4F65-BEE9-1401C8B172CC}" type="datetimeFigureOut">
               <a:rPr lang="en-IN" smtClean="0"/>
-              <a:t>26-02-2023</a:t>
+              <a:t>20-05-2023</a:t>
             </a:fld>
             <a:endParaRPr lang="en-IN"/>
           </a:p>
@@ -2361,7 +2361,7 @@
           <a:p>
             <a:fld id="{F221E457-F2B5-4F65-BEE9-1401C8B172CC}" type="datetimeFigureOut">
               <a:rPr lang="en-IN" smtClean="0"/>
-              <a:t>26-02-2023</a:t>
+              <a:t>20-05-2023</a:t>
             </a:fld>
             <a:endParaRPr lang="en-IN"/>
           </a:p>
@@ -2574,7 +2574,7 @@
           <a:p>
             <a:fld id="{F221E457-F2B5-4F65-BEE9-1401C8B172CC}" type="datetimeFigureOut">
               <a:rPr lang="en-IN" smtClean="0"/>
-              <a:t>26-02-2023</a:t>
+              <a:t>20-05-2023</a:t>
             </a:fld>
             <a:endParaRPr lang="en-IN"/>
           </a:p>
@@ -7685,55 +7685,785 @@
       </p:sp>
       <p:sp>
         <p:nvSpPr>
-          <p:cNvPr id="5" name="TextBox 4"/>
-          <p:cNvSpPr txBox="1"/>
-          <p:nvPr/>
-        </p:nvSpPr>
-        <p:spPr>
-          <a:xfrm>
-            <a:off x="1317072" y="1879134"/>
-            <a:ext cx="4018729" cy="923330"/>
-          </a:xfrm>
-          <a:prstGeom prst="rect">
-            <a:avLst/>
-          </a:prstGeom>
-          <a:noFill/>
-        </p:spPr>
-        <p:txBody>
-          <a:bodyPr wrap="none" rtlCol="0">
-            <a:spAutoFit/>
-          </a:bodyPr>
-          <a:lstStyle/>
-          <a:p>
-            <a:pPr marL="285750" indent="-285750">
-              <a:buFont typeface="Arial" panose="020B0604020202020204" pitchFamily="34" charset="0"/>
-              <a:buChar char="•"/>
+          <p:cNvPr id="6" name="Rectangle 5"/>
+          <p:cNvSpPr/>
+          <p:nvPr/>
+        </p:nvSpPr>
+        <p:spPr>
+          <a:xfrm>
+            <a:off x="3158456" y="1082396"/>
+            <a:ext cx="2642530" cy="4966066"/>
+          </a:xfrm>
+          <a:prstGeom prst="rect">
+            <a:avLst/>
+          </a:prstGeom>
+        </p:spPr>
+        <p:style>
+          <a:lnRef idx="2">
+            <a:schemeClr val="accent1">
+              <a:shade val="50000"/>
+            </a:schemeClr>
+          </a:lnRef>
+          <a:fillRef idx="1">
+            <a:schemeClr val="accent1"/>
+          </a:fillRef>
+          <a:effectRef idx="0">
+            <a:schemeClr val="accent1"/>
+          </a:effectRef>
+          <a:fontRef idx="minor">
+            <a:schemeClr val="lt1"/>
+          </a:fontRef>
+        </p:style>
+        <p:txBody>
+          <a:bodyPr rtlCol="0" anchor="ctr"/>
+          <a:lstStyle/>
+          <a:p>
+            <a:pPr marL="0" marR="0" lvl="0" indent="0" algn="ctr" defTabSz="914400" rtl="0" eaLnBrk="1" fontAlgn="auto" latinLnBrk="0" hangingPunct="1">
+              <a:lnSpc>
+                <a:spcPct val="100000"/>
+              </a:lnSpc>
+              <a:spcBef>
+                <a:spcPts val="0"/>
+              </a:spcBef>
+              <a:spcAft>
+                <a:spcPts val="0"/>
+              </a:spcAft>
+              <a:buClrTx/>
+              <a:buSzTx/>
+              <a:buFontTx/>
+              <a:buNone/>
+              <a:tabLst/>
+              <a:defRPr/>
             </a:pPr>
-            <a:r>
-              <a:rPr lang="en-IN" dirty="0" smtClean="0"/>
-              <a:t>Show Item Stock</a:t>
-            </a:r>
-          </a:p>
-          <a:p>
-            <a:pPr marL="285750" indent="-285750">
-              <a:buFont typeface="Arial" panose="020B0604020202020204" pitchFamily="34" charset="0"/>
-              <a:buChar char="•"/>
-            </a:pPr>
-            <a:r>
-              <a:rPr lang="en-IN" dirty="0" smtClean="0"/>
-              <a:t>Item Offer Details</a:t>
-            </a:r>
-          </a:p>
-          <a:p>
-            <a:pPr marL="285750" indent="-285750">
-              <a:buFont typeface="Arial" panose="020B0604020202020204" pitchFamily="34" charset="0"/>
-              <a:buChar char="•"/>
-            </a:pPr>
-            <a:r>
-              <a:rPr lang="en-IN" dirty="0" smtClean="0"/>
-              <a:t>There might be some additional fields</a:t>
+            <a:endParaRPr kumimoji="0" lang="en-IN" sz="1800" b="0" i="0" u="none" strike="noStrike" kern="1200" cap="none" spc="0" normalizeH="0" baseline="0" noProof="0" dirty="0" smtClean="0">
+              <a:ln>
+                <a:noFill/>
+              </a:ln>
+              <a:solidFill>
+                <a:prstClr val="white"/>
+              </a:solidFill>
+              <a:effectLst/>
+              <a:uLnTx/>
+              <a:uFillTx/>
+              <a:latin typeface="Calibri" panose="020F0502020204030204"/>
+              <a:ea typeface="+mn-ea"/>
+              <a:cs typeface="+mn-cs"/>
+            </a:endParaRPr>
+          </a:p>
+        </p:txBody>
+      </p:sp>
+      <p:sp>
+        <p:nvSpPr>
+          <p:cNvPr id="2" name="Rectangle 1"/>
+          <p:cNvSpPr/>
+          <p:nvPr/>
+        </p:nvSpPr>
+        <p:spPr>
+          <a:xfrm>
+            <a:off x="3615655" y="1527321"/>
+            <a:ext cx="1728132" cy="302004"/>
+          </a:xfrm>
+          <a:prstGeom prst="rect">
+            <a:avLst/>
+          </a:prstGeom>
+        </p:spPr>
+        <p:style>
+          <a:lnRef idx="2">
+            <a:schemeClr val="accent1">
+              <a:shade val="50000"/>
+            </a:schemeClr>
+          </a:lnRef>
+          <a:fillRef idx="1">
+            <a:schemeClr val="accent1"/>
+          </a:fillRef>
+          <a:effectRef idx="0">
+            <a:schemeClr val="accent1"/>
+          </a:effectRef>
+          <a:fontRef idx="minor">
+            <a:schemeClr val="lt1"/>
+          </a:fontRef>
+        </p:style>
+        <p:txBody>
+          <a:bodyPr rtlCol="0" anchor="ctr"/>
+          <a:lstStyle/>
+          <a:p>
+            <a:pPr algn="ctr"/>
+            <a:r>
+              <a:rPr lang="en-US" dirty="0" err="1" smtClean="0"/>
+              <a:t>Itemcode</a:t>
             </a:r>
             <a:endParaRPr lang="en-IN" dirty="0"/>
+          </a:p>
+        </p:txBody>
+      </p:sp>
+      <p:sp>
+        <p:nvSpPr>
+          <p:cNvPr id="9" name="Rectangle 8"/>
+          <p:cNvSpPr/>
+          <p:nvPr/>
+        </p:nvSpPr>
+        <p:spPr>
+          <a:xfrm>
+            <a:off x="3615655" y="2257697"/>
+            <a:ext cx="1728132" cy="302004"/>
+          </a:xfrm>
+          <a:prstGeom prst="rect">
+            <a:avLst/>
+          </a:prstGeom>
+        </p:spPr>
+        <p:style>
+          <a:lnRef idx="2">
+            <a:schemeClr val="accent1">
+              <a:shade val="50000"/>
+            </a:schemeClr>
+          </a:lnRef>
+          <a:fillRef idx="1">
+            <a:schemeClr val="accent1"/>
+          </a:fillRef>
+          <a:effectRef idx="0">
+            <a:schemeClr val="accent1"/>
+          </a:effectRef>
+          <a:fontRef idx="minor">
+            <a:schemeClr val="lt1"/>
+          </a:fontRef>
+        </p:style>
+        <p:txBody>
+          <a:bodyPr rtlCol="0" anchor="ctr"/>
+          <a:lstStyle/>
+          <a:p>
+            <a:pPr algn="ctr"/>
+            <a:r>
+              <a:rPr lang="en-US" dirty="0" smtClean="0"/>
+              <a:t>Item Name</a:t>
+            </a:r>
+            <a:endParaRPr lang="en-IN" dirty="0"/>
+          </a:p>
+        </p:txBody>
+      </p:sp>
+      <p:sp>
+        <p:nvSpPr>
+          <p:cNvPr id="10" name="Rectangle 9"/>
+          <p:cNvSpPr/>
+          <p:nvPr/>
+        </p:nvSpPr>
+        <p:spPr>
+          <a:xfrm>
+            <a:off x="3615655" y="1894318"/>
+            <a:ext cx="1728132" cy="302004"/>
+          </a:xfrm>
+          <a:prstGeom prst="rect">
+            <a:avLst/>
+          </a:prstGeom>
+        </p:spPr>
+        <p:style>
+          <a:lnRef idx="2">
+            <a:schemeClr val="accent1">
+              <a:shade val="50000"/>
+            </a:schemeClr>
+          </a:lnRef>
+          <a:fillRef idx="1">
+            <a:schemeClr val="accent1"/>
+          </a:fillRef>
+          <a:effectRef idx="0">
+            <a:schemeClr val="accent1"/>
+          </a:effectRef>
+          <a:fontRef idx="minor">
+            <a:schemeClr val="lt1"/>
+          </a:fontRef>
+        </p:style>
+        <p:txBody>
+          <a:bodyPr rtlCol="0" anchor="ctr"/>
+          <a:lstStyle/>
+          <a:p>
+            <a:pPr algn="ctr"/>
+            <a:r>
+              <a:rPr lang="en-US" dirty="0" err="1" smtClean="0"/>
+              <a:t>SKUCode</a:t>
+            </a:r>
+            <a:endParaRPr lang="en-IN" dirty="0"/>
+          </a:p>
+        </p:txBody>
+      </p:sp>
+      <p:sp>
+        <p:nvSpPr>
+          <p:cNvPr id="11" name="Rectangle 10"/>
+          <p:cNvSpPr/>
+          <p:nvPr/>
+        </p:nvSpPr>
+        <p:spPr>
+          <a:xfrm>
+            <a:off x="3263316" y="2625969"/>
+            <a:ext cx="2416029" cy="849382"/>
+          </a:xfrm>
+          <a:prstGeom prst="rect">
+            <a:avLst/>
+          </a:prstGeom>
+        </p:spPr>
+        <p:style>
+          <a:lnRef idx="2">
+            <a:schemeClr val="accent1">
+              <a:shade val="50000"/>
+            </a:schemeClr>
+          </a:lnRef>
+          <a:fillRef idx="1">
+            <a:schemeClr val="accent1"/>
+          </a:fillRef>
+          <a:effectRef idx="0">
+            <a:schemeClr val="accent1"/>
+          </a:effectRef>
+          <a:fontRef idx="minor">
+            <a:schemeClr val="lt1"/>
+          </a:fontRef>
+        </p:style>
+        <p:txBody>
+          <a:bodyPr rtlCol="0" anchor="ctr"/>
+          <a:lstStyle/>
+          <a:p>
+            <a:pPr algn="ctr"/>
+            <a:r>
+              <a:rPr lang="en-US" dirty="0" smtClean="0"/>
+              <a:t>Price Details</a:t>
+            </a:r>
+          </a:p>
+          <a:p>
+            <a:pPr algn="ctr"/>
+            <a:r>
+              <a:rPr lang="en-US" sz="1050" dirty="0" smtClean="0"/>
+              <a:t>MRP1, Sale Price1</a:t>
+            </a:r>
+          </a:p>
+          <a:p>
+            <a:pPr algn="ctr"/>
+            <a:r>
+              <a:rPr lang="en-US" sz="1050" dirty="0" smtClean="0"/>
+              <a:t>MRP2, Sale Price2</a:t>
+            </a:r>
+          </a:p>
+          <a:p>
+            <a:pPr algn="ctr"/>
+            <a:r>
+              <a:rPr lang="en-US" sz="1050" dirty="0" smtClean="0"/>
+              <a:t>MRP3, Sale Price3</a:t>
+            </a:r>
+          </a:p>
+          <a:p>
+            <a:pPr algn="ctr"/>
+            <a:r>
+              <a:rPr lang="en-US" sz="1050" dirty="0" smtClean="0"/>
+              <a:t>MRP4, SalePrice4</a:t>
+            </a:r>
+            <a:endParaRPr lang="en-IN" sz="1050" dirty="0"/>
+          </a:p>
+        </p:txBody>
+      </p:sp>
+      <p:sp>
+        <p:nvSpPr>
+          <p:cNvPr id="3" name="Rectangle 2"/>
+          <p:cNvSpPr/>
+          <p:nvPr/>
+        </p:nvSpPr>
+        <p:spPr>
+          <a:xfrm>
+            <a:off x="3263316" y="3565429"/>
+            <a:ext cx="2416029" cy="872455"/>
+          </a:xfrm>
+          <a:prstGeom prst="rect">
+            <a:avLst/>
+          </a:prstGeom>
+        </p:spPr>
+        <p:style>
+          <a:lnRef idx="2">
+            <a:schemeClr val="accent1">
+              <a:shade val="50000"/>
+            </a:schemeClr>
+          </a:lnRef>
+          <a:fillRef idx="1">
+            <a:schemeClr val="accent1"/>
+          </a:fillRef>
+          <a:effectRef idx="0">
+            <a:schemeClr val="accent1"/>
+          </a:effectRef>
+          <a:fontRef idx="minor">
+            <a:schemeClr val="lt1"/>
+          </a:fontRef>
+        </p:style>
+        <p:txBody>
+          <a:bodyPr rtlCol="0" anchor="ctr"/>
+          <a:lstStyle/>
+          <a:p>
+            <a:pPr algn="ctr"/>
+            <a:r>
+              <a:rPr lang="en-US" b="1" dirty="0" smtClean="0"/>
+              <a:t>Offer Details</a:t>
+            </a:r>
+          </a:p>
+          <a:p>
+            <a:pPr algn="ctr"/>
+            <a:r>
+              <a:rPr lang="en-US" sz="800" dirty="0" smtClean="0"/>
+              <a:t>Offer1 Name, Offer1 Type, Offer1 Value, Offer1 Price</a:t>
+            </a:r>
+          </a:p>
+          <a:p>
+            <a:pPr algn="ctr"/>
+            <a:r>
+              <a:rPr lang="en-US" sz="800" dirty="0" smtClean="0"/>
+              <a:t>Offer2 </a:t>
+            </a:r>
+            <a:r>
+              <a:rPr lang="en-US" sz="800" dirty="0"/>
+              <a:t>Name, </a:t>
+            </a:r>
+            <a:r>
+              <a:rPr lang="en-US" sz="800" dirty="0" smtClean="0"/>
+              <a:t>Offer2 </a:t>
+            </a:r>
+            <a:r>
+              <a:rPr lang="en-US" sz="800" dirty="0"/>
+              <a:t>Type, </a:t>
+            </a:r>
+            <a:r>
+              <a:rPr lang="en-US" sz="800" dirty="0" smtClean="0"/>
+              <a:t>Offer2 </a:t>
+            </a:r>
+            <a:r>
+              <a:rPr lang="en-US" sz="800" dirty="0"/>
+              <a:t>Value, </a:t>
+            </a:r>
+            <a:r>
+              <a:rPr lang="en-US" sz="800" dirty="0" smtClean="0"/>
+              <a:t>Offer2 </a:t>
+            </a:r>
+            <a:r>
+              <a:rPr lang="en-US" sz="800" dirty="0"/>
+              <a:t>Price</a:t>
+            </a:r>
+          </a:p>
+          <a:p>
+            <a:pPr algn="ctr"/>
+            <a:r>
+              <a:rPr lang="en-US" sz="800" dirty="0" smtClean="0"/>
+              <a:t>Offer3 </a:t>
+            </a:r>
+            <a:r>
+              <a:rPr lang="en-US" sz="800" dirty="0"/>
+              <a:t>Name, </a:t>
+            </a:r>
+            <a:r>
+              <a:rPr lang="en-US" sz="800" dirty="0" smtClean="0"/>
+              <a:t>Offer3 </a:t>
+            </a:r>
+            <a:r>
+              <a:rPr lang="en-US" sz="800" dirty="0"/>
+              <a:t>Type, </a:t>
+            </a:r>
+            <a:r>
+              <a:rPr lang="en-US" sz="800" dirty="0" smtClean="0"/>
+              <a:t>Offer3 </a:t>
+            </a:r>
+            <a:r>
+              <a:rPr lang="en-US" sz="800" dirty="0"/>
+              <a:t>Value, </a:t>
+            </a:r>
+            <a:r>
+              <a:rPr lang="en-US" sz="800" dirty="0" smtClean="0"/>
+              <a:t>Offer3 Price</a:t>
+            </a:r>
+          </a:p>
+          <a:p>
+            <a:pPr algn="ctr"/>
+            <a:r>
+              <a:rPr lang="en-US" sz="800" dirty="0" smtClean="0"/>
+              <a:t>Offer4 </a:t>
+            </a:r>
+            <a:r>
+              <a:rPr lang="en-US" sz="800" dirty="0"/>
+              <a:t>Name, </a:t>
+            </a:r>
+            <a:r>
+              <a:rPr lang="en-US" sz="800" dirty="0" smtClean="0"/>
+              <a:t>Offer4 </a:t>
+            </a:r>
+            <a:r>
+              <a:rPr lang="en-US" sz="800" dirty="0"/>
+              <a:t>Type, </a:t>
+            </a:r>
+            <a:r>
+              <a:rPr lang="en-US" sz="800" dirty="0" smtClean="0"/>
+              <a:t>Offer4 </a:t>
+            </a:r>
+            <a:r>
+              <a:rPr lang="en-US" sz="800" dirty="0"/>
+              <a:t>Value, </a:t>
+            </a:r>
+            <a:r>
+              <a:rPr lang="en-US" sz="800" dirty="0" smtClean="0"/>
+              <a:t>Offer4 Price</a:t>
+            </a:r>
+            <a:endParaRPr lang="en-US" sz="800" dirty="0"/>
+          </a:p>
+        </p:txBody>
+      </p:sp>
+      <p:sp>
+        <p:nvSpPr>
+          <p:cNvPr id="13" name="Rectangle 12"/>
+          <p:cNvSpPr/>
+          <p:nvPr/>
+        </p:nvSpPr>
+        <p:spPr>
+          <a:xfrm>
+            <a:off x="3263317" y="4489509"/>
+            <a:ext cx="2416029" cy="564157"/>
+          </a:xfrm>
+          <a:prstGeom prst="rect">
+            <a:avLst/>
+          </a:prstGeom>
+        </p:spPr>
+        <p:style>
+          <a:lnRef idx="2">
+            <a:schemeClr val="accent1">
+              <a:shade val="50000"/>
+            </a:schemeClr>
+          </a:lnRef>
+          <a:fillRef idx="1">
+            <a:schemeClr val="accent1"/>
+          </a:fillRef>
+          <a:effectRef idx="0">
+            <a:schemeClr val="accent1"/>
+          </a:effectRef>
+          <a:fontRef idx="minor">
+            <a:schemeClr val="lt1"/>
+          </a:fontRef>
+        </p:style>
+        <p:txBody>
+          <a:bodyPr rtlCol="0" anchor="ctr"/>
+          <a:lstStyle/>
+          <a:p>
+            <a:pPr algn="ctr"/>
+            <a:r>
+              <a:rPr lang="en-US" dirty="0" smtClean="0"/>
+              <a:t>Cost Price Details</a:t>
+            </a:r>
+          </a:p>
+          <a:p>
+            <a:pPr algn="ctr"/>
+            <a:r>
+              <a:rPr lang="en-US" sz="1000" dirty="0" smtClean="0"/>
+              <a:t>Cost Price1, GST1</a:t>
+            </a:r>
+          </a:p>
+          <a:p>
+            <a:pPr algn="ctr"/>
+            <a:r>
+              <a:rPr lang="en-US" sz="1000" dirty="0" smtClean="0"/>
+              <a:t>Cost Price2, GST2</a:t>
+            </a:r>
+            <a:endParaRPr lang="en-IN" sz="1000" dirty="0"/>
+          </a:p>
+        </p:txBody>
+      </p:sp>
+      <p:sp>
+        <p:nvSpPr>
+          <p:cNvPr id="14" name="Rectangle 13"/>
+          <p:cNvSpPr/>
+          <p:nvPr/>
+        </p:nvSpPr>
+        <p:spPr>
+          <a:xfrm>
+            <a:off x="3271707" y="5499639"/>
+            <a:ext cx="2416029" cy="481777"/>
+          </a:xfrm>
+          <a:prstGeom prst="rect">
+            <a:avLst/>
+          </a:prstGeom>
+        </p:spPr>
+        <p:style>
+          <a:lnRef idx="2">
+            <a:schemeClr val="accent1">
+              <a:shade val="50000"/>
+            </a:schemeClr>
+          </a:lnRef>
+          <a:fillRef idx="1">
+            <a:schemeClr val="accent1"/>
+          </a:fillRef>
+          <a:effectRef idx="0">
+            <a:schemeClr val="accent1"/>
+          </a:effectRef>
+          <a:fontRef idx="minor">
+            <a:schemeClr val="lt1"/>
+          </a:fontRef>
+        </p:style>
+        <p:txBody>
+          <a:bodyPr rtlCol="0" anchor="ctr"/>
+          <a:lstStyle/>
+          <a:p>
+            <a:pPr algn="ctr"/>
+            <a:r>
+              <a:rPr lang="en-US" sz="1600" b="1" dirty="0" smtClean="0"/>
+              <a:t>Stock Details</a:t>
+            </a:r>
+          </a:p>
+          <a:p>
+            <a:pPr algn="ctr"/>
+            <a:r>
+              <a:rPr lang="en-US" sz="900" b="1" dirty="0" smtClean="0"/>
+              <a:t>Branch1, Value1, Intransit1, Running sale1</a:t>
+            </a:r>
+          </a:p>
+          <a:p>
+            <a:pPr algn="ctr"/>
+            <a:endParaRPr lang="en-US" sz="900" b="1" dirty="0" smtClean="0"/>
+          </a:p>
+        </p:txBody>
+      </p:sp>
+      <p:sp>
+        <p:nvSpPr>
+          <p:cNvPr id="15" name="Rectangle 14"/>
+          <p:cNvSpPr/>
+          <p:nvPr/>
+        </p:nvSpPr>
+        <p:spPr>
+          <a:xfrm>
+            <a:off x="3389152" y="1191236"/>
+            <a:ext cx="125835" cy="117446"/>
+          </a:xfrm>
+          <a:prstGeom prst="rect">
+            <a:avLst/>
+          </a:prstGeom>
+        </p:spPr>
+        <p:style>
+          <a:lnRef idx="2">
+            <a:schemeClr val="accent1">
+              <a:shade val="50000"/>
+            </a:schemeClr>
+          </a:lnRef>
+          <a:fillRef idx="1">
+            <a:schemeClr val="accent1"/>
+          </a:fillRef>
+          <a:effectRef idx="0">
+            <a:schemeClr val="accent1"/>
+          </a:effectRef>
+          <a:fontRef idx="minor">
+            <a:schemeClr val="lt1"/>
+          </a:fontRef>
+        </p:style>
+        <p:txBody>
+          <a:bodyPr rtlCol="0" anchor="ctr"/>
+          <a:lstStyle/>
+          <a:p>
+            <a:pPr algn="ctr"/>
+            <a:endParaRPr lang="en-IN"/>
+          </a:p>
+        </p:txBody>
+      </p:sp>
+      <p:sp>
+        <p:nvSpPr>
+          <p:cNvPr id="17" name="Rectangle 16"/>
+          <p:cNvSpPr/>
+          <p:nvPr/>
+        </p:nvSpPr>
+        <p:spPr>
+          <a:xfrm>
+            <a:off x="4798503" y="1191236"/>
+            <a:ext cx="92279" cy="117446"/>
+          </a:xfrm>
+          <a:prstGeom prst="rect">
+            <a:avLst/>
+          </a:prstGeom>
+        </p:spPr>
+        <p:style>
+          <a:lnRef idx="2">
+            <a:schemeClr val="accent1">
+              <a:shade val="50000"/>
+            </a:schemeClr>
+          </a:lnRef>
+          <a:fillRef idx="1">
+            <a:schemeClr val="accent1"/>
+          </a:fillRef>
+          <a:effectRef idx="0">
+            <a:schemeClr val="accent1"/>
+          </a:effectRef>
+          <a:fontRef idx="minor">
+            <a:schemeClr val="lt1"/>
+          </a:fontRef>
+        </p:style>
+        <p:txBody>
+          <a:bodyPr rtlCol="0" anchor="ctr"/>
+          <a:lstStyle/>
+          <a:p>
+            <a:pPr algn="ctr"/>
+            <a:endParaRPr lang="en-IN"/>
+          </a:p>
+        </p:txBody>
+      </p:sp>
+      <p:sp>
+        <p:nvSpPr>
+          <p:cNvPr id="18" name="Rectangle 17"/>
+          <p:cNvSpPr/>
+          <p:nvPr/>
+        </p:nvSpPr>
+        <p:spPr>
+          <a:xfrm>
+            <a:off x="3514987" y="1191236"/>
+            <a:ext cx="796954" cy="117446"/>
+          </a:xfrm>
+          <a:prstGeom prst="rect">
+            <a:avLst/>
+          </a:prstGeom>
+        </p:spPr>
+        <p:style>
+          <a:lnRef idx="2">
+            <a:schemeClr val="accent1">
+              <a:shade val="50000"/>
+            </a:schemeClr>
+          </a:lnRef>
+          <a:fillRef idx="1">
+            <a:schemeClr val="accent1"/>
+          </a:fillRef>
+          <a:effectRef idx="0">
+            <a:schemeClr val="accent1"/>
+          </a:effectRef>
+          <a:fontRef idx="minor">
+            <a:schemeClr val="lt1"/>
+          </a:fontRef>
+        </p:style>
+        <p:txBody>
+          <a:bodyPr rtlCol="0" anchor="ctr"/>
+          <a:lstStyle/>
+          <a:p>
+            <a:pPr algn="ctr"/>
+            <a:r>
+              <a:rPr lang="en-US" sz="900" dirty="0" smtClean="0"/>
+              <a:t>Warehouse</a:t>
+            </a:r>
+            <a:endParaRPr lang="en-IN" sz="900" dirty="0"/>
+          </a:p>
+        </p:txBody>
+      </p:sp>
+      <p:sp>
+        <p:nvSpPr>
+          <p:cNvPr id="19" name="Rectangle 18"/>
+          <p:cNvSpPr/>
+          <p:nvPr/>
+        </p:nvSpPr>
+        <p:spPr>
+          <a:xfrm>
+            <a:off x="4890782" y="1191236"/>
+            <a:ext cx="796954" cy="117446"/>
+          </a:xfrm>
+          <a:prstGeom prst="rect">
+            <a:avLst/>
+          </a:prstGeom>
+        </p:spPr>
+        <p:style>
+          <a:lnRef idx="2">
+            <a:schemeClr val="accent1">
+              <a:shade val="50000"/>
+            </a:schemeClr>
+          </a:lnRef>
+          <a:fillRef idx="1">
+            <a:schemeClr val="accent1"/>
+          </a:fillRef>
+          <a:effectRef idx="0">
+            <a:schemeClr val="accent1"/>
+          </a:effectRef>
+          <a:fontRef idx="minor">
+            <a:schemeClr val="lt1"/>
+          </a:fontRef>
+        </p:style>
+        <p:txBody>
+          <a:bodyPr rtlCol="0" anchor="ctr"/>
+          <a:lstStyle/>
+          <a:p>
+            <a:pPr algn="ctr"/>
+            <a:r>
+              <a:rPr lang="en-US" sz="900" dirty="0" smtClean="0"/>
+              <a:t>Cloud</a:t>
+            </a:r>
+            <a:endParaRPr lang="en-IN" sz="900" dirty="0"/>
+          </a:p>
+        </p:txBody>
+      </p:sp>
+      <p:cxnSp>
+        <p:nvCxnSpPr>
+          <p:cNvPr id="21" name="Curved Connector 20"/>
+          <p:cNvCxnSpPr>
+            <a:stCxn id="15" idx="1"/>
+            <a:endCxn id="15" idx="2"/>
+          </p:cNvCxnSpPr>
+          <p:nvPr/>
+        </p:nvCxnSpPr>
+        <p:spPr>
+          <a:xfrm rot="10800000" flipH="1" flipV="1">
+            <a:off x="3389152" y="1249958"/>
+            <a:ext cx="62918" cy="58723"/>
+          </a:xfrm>
+          <a:prstGeom prst="curvedConnector4">
+            <a:avLst>
+              <a:gd name="adj1" fmla="val -363330"/>
+              <a:gd name="adj2" fmla="val 489285"/>
+            </a:avLst>
+          </a:prstGeom>
+          <a:ln>
+            <a:tailEnd type="triangle"/>
+          </a:ln>
+        </p:spPr>
+        <p:style>
+          <a:lnRef idx="1">
+            <a:schemeClr val="accent1"/>
+          </a:lnRef>
+          <a:fillRef idx="0">
+            <a:schemeClr val="accent1"/>
+          </a:fillRef>
+          <a:effectRef idx="0">
+            <a:schemeClr val="accent1"/>
+          </a:effectRef>
+          <a:fontRef idx="minor">
+            <a:schemeClr val="tx1"/>
+          </a:fontRef>
+        </p:style>
+      </p:cxnSp>
+      <p:sp>
+        <p:nvSpPr>
+          <p:cNvPr id="22" name="Curved Up Arrow 21"/>
+          <p:cNvSpPr/>
+          <p:nvPr/>
+        </p:nvSpPr>
+        <p:spPr>
+          <a:xfrm>
+            <a:off x="3389152" y="1191236"/>
+            <a:ext cx="125835" cy="58722"/>
+          </a:xfrm>
+          <a:prstGeom prst="curvedUpArrow">
+            <a:avLst/>
+          </a:prstGeom>
+        </p:spPr>
+        <p:style>
+          <a:lnRef idx="2">
+            <a:schemeClr val="accent4">
+              <a:shade val="50000"/>
+            </a:schemeClr>
+          </a:lnRef>
+          <a:fillRef idx="1">
+            <a:schemeClr val="accent4"/>
+          </a:fillRef>
+          <a:effectRef idx="0">
+            <a:schemeClr val="accent4"/>
+          </a:effectRef>
+          <a:fontRef idx="minor">
+            <a:schemeClr val="lt1"/>
+          </a:fontRef>
+        </p:style>
+        <p:txBody>
+          <a:bodyPr rtlCol="0" anchor="ctr"/>
+          <a:lstStyle/>
+          <a:p>
+            <a:pPr algn="ctr"/>
+            <a:endParaRPr lang="en-IN">
+              <a:solidFill>
+                <a:schemeClr val="tx1"/>
+              </a:solidFill>
+            </a:endParaRPr>
           </a:p>
         </p:txBody>
       </p:sp>

</xml_diff>

<commit_message>
Changes for new implementation
</commit_message>
<xml_diff>
--- a/Requirements/NSRetail_Mobile_Requirements.pptx
+++ b/Requirements/NSRetail_Mobile_Requirements.pptx
@@ -253,7 +253,7 @@
           <a:p>
             <a:fld id="{F221E457-F2B5-4F65-BEE9-1401C8B172CC}" type="datetimeFigureOut">
               <a:rPr lang="en-IN" smtClean="0"/>
-              <a:t>20-05-2023</a:t>
+              <a:t>31-05-2023</a:t>
             </a:fld>
             <a:endParaRPr lang="en-IN"/>
           </a:p>
@@ -423,7 +423,7 @@
           <a:p>
             <a:fld id="{F221E457-F2B5-4F65-BEE9-1401C8B172CC}" type="datetimeFigureOut">
               <a:rPr lang="en-IN" smtClean="0"/>
-              <a:t>20-05-2023</a:t>
+              <a:t>31-05-2023</a:t>
             </a:fld>
             <a:endParaRPr lang="en-IN"/>
           </a:p>
@@ -603,7 +603,7 @@
           <a:p>
             <a:fld id="{F221E457-F2B5-4F65-BEE9-1401C8B172CC}" type="datetimeFigureOut">
               <a:rPr lang="en-IN" smtClean="0"/>
-              <a:t>20-05-2023</a:t>
+              <a:t>31-05-2023</a:t>
             </a:fld>
             <a:endParaRPr lang="en-IN"/>
           </a:p>
@@ -773,7 +773,7 @@
           <a:p>
             <a:fld id="{F221E457-F2B5-4F65-BEE9-1401C8B172CC}" type="datetimeFigureOut">
               <a:rPr lang="en-IN" smtClean="0"/>
-              <a:t>20-05-2023</a:t>
+              <a:t>31-05-2023</a:t>
             </a:fld>
             <a:endParaRPr lang="en-IN"/>
           </a:p>
@@ -1019,7 +1019,7 @@
           <a:p>
             <a:fld id="{F221E457-F2B5-4F65-BEE9-1401C8B172CC}" type="datetimeFigureOut">
               <a:rPr lang="en-IN" smtClean="0"/>
-              <a:t>20-05-2023</a:t>
+              <a:t>31-05-2023</a:t>
             </a:fld>
             <a:endParaRPr lang="en-IN"/>
           </a:p>
@@ -1251,7 +1251,7 @@
           <a:p>
             <a:fld id="{F221E457-F2B5-4F65-BEE9-1401C8B172CC}" type="datetimeFigureOut">
               <a:rPr lang="en-IN" smtClean="0"/>
-              <a:t>20-05-2023</a:t>
+              <a:t>31-05-2023</a:t>
             </a:fld>
             <a:endParaRPr lang="en-IN"/>
           </a:p>
@@ -1618,7 +1618,7 @@
           <a:p>
             <a:fld id="{F221E457-F2B5-4F65-BEE9-1401C8B172CC}" type="datetimeFigureOut">
               <a:rPr lang="en-IN" smtClean="0"/>
-              <a:t>20-05-2023</a:t>
+              <a:t>31-05-2023</a:t>
             </a:fld>
             <a:endParaRPr lang="en-IN"/>
           </a:p>
@@ -1736,7 +1736,7 @@
           <a:p>
             <a:fld id="{F221E457-F2B5-4F65-BEE9-1401C8B172CC}" type="datetimeFigureOut">
               <a:rPr lang="en-IN" smtClean="0"/>
-              <a:t>20-05-2023</a:t>
+              <a:t>31-05-2023</a:t>
             </a:fld>
             <a:endParaRPr lang="en-IN"/>
           </a:p>
@@ -1831,7 +1831,7 @@
           <a:p>
             <a:fld id="{F221E457-F2B5-4F65-BEE9-1401C8B172CC}" type="datetimeFigureOut">
               <a:rPr lang="en-IN" smtClean="0"/>
-              <a:t>20-05-2023</a:t>
+              <a:t>31-05-2023</a:t>
             </a:fld>
             <a:endParaRPr lang="en-IN"/>
           </a:p>
@@ -2108,7 +2108,7 @@
           <a:p>
             <a:fld id="{F221E457-F2B5-4F65-BEE9-1401C8B172CC}" type="datetimeFigureOut">
               <a:rPr lang="en-IN" smtClean="0"/>
-              <a:t>20-05-2023</a:t>
+              <a:t>31-05-2023</a:t>
             </a:fld>
             <a:endParaRPr lang="en-IN"/>
           </a:p>
@@ -2361,7 +2361,7 @@
           <a:p>
             <a:fld id="{F221E457-F2B5-4F65-BEE9-1401C8B172CC}" type="datetimeFigureOut">
               <a:rPr lang="en-IN" smtClean="0"/>
-              <a:t>20-05-2023</a:t>
+              <a:t>31-05-2023</a:t>
             </a:fld>
             <a:endParaRPr lang="en-IN"/>
           </a:p>
@@ -2574,7 +2574,7 @@
           <a:p>
             <a:fld id="{F221E457-F2B5-4F65-BEE9-1401C8B172CC}" type="datetimeFigureOut">
               <a:rPr lang="en-IN" smtClean="0"/>
-              <a:t>20-05-2023</a:t>
+              <a:t>31-05-2023</a:t>
             </a:fld>
             <a:endParaRPr lang="en-IN"/>
           </a:p>
@@ -7691,7 +7691,7 @@
         </p:nvSpPr>
         <p:spPr>
           <a:xfrm>
-            <a:off x="3158456" y="1082396"/>
+            <a:off x="3150065" y="1082396"/>
             <a:ext cx="2642530" cy="4966066"/>
           </a:xfrm>
           <a:prstGeom prst="rect">
@@ -7760,8 +7760,8 @@
         </p:nvSpPr>
         <p:spPr>
           <a:xfrm>
-            <a:off x="3615655" y="1527321"/>
-            <a:ext cx="1728132" cy="302004"/>
+            <a:off x="3615655" y="1821673"/>
+            <a:ext cx="1728132" cy="198152"/>
           </a:xfrm>
           <a:prstGeom prst="rect">
             <a:avLst/>
@@ -7804,8 +7804,8 @@
         </p:nvSpPr>
         <p:spPr>
           <a:xfrm>
-            <a:off x="3615655" y="2257697"/>
-            <a:ext cx="1728132" cy="302004"/>
+            <a:off x="3615655" y="2349967"/>
+            <a:ext cx="1728132" cy="209733"/>
           </a:xfrm>
           <a:prstGeom prst="rect">
             <a:avLst/>
@@ -7848,8 +7848,8 @@
         </p:nvSpPr>
         <p:spPr>
           <a:xfrm>
-            <a:off x="3615655" y="1894318"/>
-            <a:ext cx="1728132" cy="302004"/>
+            <a:off x="3615655" y="2078468"/>
+            <a:ext cx="1728132" cy="211008"/>
           </a:xfrm>
           <a:prstGeom prst="rect">
             <a:avLst/>
@@ -7922,37 +7922,46 @@
             <a:pPr algn="ctr"/>
             <a:r>
               <a:rPr lang="en-US" dirty="0" smtClean="0"/>
-              <a:t>Price Details</a:t>
+              <a:t>Price </a:t>
+            </a:r>
+            <a:r>
+              <a:rPr lang="en-US" dirty="0" smtClean="0"/>
+              <a:t>Details</a:t>
             </a:r>
           </a:p>
           <a:p>
             <a:pPr algn="ctr"/>
             <a:r>
-              <a:rPr lang="en-US" sz="1050" dirty="0" smtClean="0"/>
-              <a:t>MRP1, Sale Price1</a:t>
-            </a:r>
+              <a:rPr lang="en-US" sz="1000" dirty="0" smtClean="0"/>
+              <a:t>MRP	</a:t>
+            </a:r>
+            <a:r>
+              <a:rPr lang="en-US" sz="1000" dirty="0" err="1" smtClean="0"/>
+              <a:t>SalePrice</a:t>
+            </a:r>
+            <a:endParaRPr lang="en-US" sz="1000" dirty="0"/>
           </a:p>
           <a:p>
             <a:pPr algn="ctr"/>
             <a:r>
-              <a:rPr lang="en-US" sz="1050" dirty="0" smtClean="0"/>
-              <a:t>MRP2, Sale Price2</a:t>
+              <a:rPr lang="en-US" sz="1000" dirty="0" smtClean="0"/>
+              <a:t>100	200</a:t>
             </a:r>
           </a:p>
           <a:p>
             <a:pPr algn="ctr"/>
             <a:r>
-              <a:rPr lang="en-US" sz="1050" dirty="0" smtClean="0"/>
-              <a:t>MRP3, Sale Price3</a:t>
+              <a:rPr lang="en-US" sz="1000" dirty="0" smtClean="0"/>
+              <a:t>101	201</a:t>
             </a:r>
           </a:p>
           <a:p>
             <a:pPr algn="ctr"/>
             <a:r>
-              <a:rPr lang="en-US" sz="1050" dirty="0" smtClean="0"/>
-              <a:t>MRP4, SalePrice4</a:t>
-            </a:r>
-            <a:endParaRPr lang="en-IN" sz="1050" dirty="0"/>
+              <a:rPr lang="en-US" sz="1000" dirty="0" smtClean="0"/>
+              <a:t>102	202</a:t>
+            </a:r>
+            <a:endParaRPr lang="en-US" sz="1000" dirty="0" smtClean="0"/>
           </a:p>
         </p:txBody>
       </p:sp>
@@ -8001,106 +8010,16 @@
             <a:pPr algn="ctr"/>
             <a:r>
               <a:rPr lang="en-US" sz="800" dirty="0" smtClean="0"/>
-              <a:t>Offer1 Name, Offer1 Type, Offer1 Value, Offer1 Price</a:t>
+              <a:t>Offer Type, Offer Name, Offer Value</a:t>
             </a:r>
           </a:p>
           <a:p>
             <a:pPr algn="ctr"/>
             <a:r>
               <a:rPr lang="en-US" sz="800" dirty="0" smtClean="0"/>
-              <a:t>Offer2 </a:t>
-            </a:r>
-            <a:r>
-              <a:rPr lang="en-US" sz="800" dirty="0"/>
-              <a:t>Name, </a:t>
-            </a:r>
-            <a:r>
-              <a:rPr lang="en-US" sz="800" dirty="0" smtClean="0"/>
-              <a:t>Offer2 </a:t>
-            </a:r>
-            <a:r>
-              <a:rPr lang="en-US" sz="800" dirty="0"/>
-              <a:t>Type, </a:t>
-            </a:r>
-            <a:r>
-              <a:rPr lang="en-US" sz="800" dirty="0" smtClean="0"/>
-              <a:t>Offer2 </a:t>
-            </a:r>
-            <a:r>
-              <a:rPr lang="en-US" sz="800" dirty="0"/>
-              <a:t>Value, </a:t>
-            </a:r>
-            <a:r>
-              <a:rPr lang="en-US" sz="800" dirty="0" smtClean="0"/>
-              <a:t>Offer2 </a:t>
-            </a:r>
-            <a:r>
-              <a:rPr lang="en-US" sz="800" dirty="0"/>
-              <a:t>Price</a:t>
-            </a:r>
-          </a:p>
-          <a:p>
-            <a:pPr algn="ctr"/>
-            <a:r>
-              <a:rPr lang="en-US" sz="800" dirty="0" smtClean="0"/>
-              <a:t>Offer3 </a:t>
-            </a:r>
-            <a:r>
-              <a:rPr lang="en-US" sz="800" dirty="0"/>
-              <a:t>Name, </a:t>
-            </a:r>
-            <a:r>
-              <a:rPr lang="en-US" sz="800" dirty="0" smtClean="0"/>
-              <a:t>Offer3 </a:t>
-            </a:r>
-            <a:r>
-              <a:rPr lang="en-US" sz="800" dirty="0"/>
-              <a:t>Type, </a:t>
-            </a:r>
-            <a:r>
-              <a:rPr lang="en-US" sz="800" dirty="0" smtClean="0"/>
-              <a:t>Offer3 </a:t>
-            </a:r>
-            <a:r>
-              <a:rPr lang="en-US" sz="800" dirty="0"/>
-              <a:t>Value, </a:t>
-            </a:r>
-            <a:r>
-              <a:rPr lang="en-US" sz="800" dirty="0" smtClean="0"/>
-              <a:t>Offer3 Price</a:t>
-            </a:r>
-          </a:p>
-          <a:p>
-            <a:pPr algn="ctr"/>
-            <a:r>
-              <a:rPr lang="en-US" sz="800" dirty="0" smtClean="0"/>
-              <a:t>Offer4 </a:t>
-            </a:r>
-            <a:r>
-              <a:rPr lang="en-US" sz="800" dirty="0"/>
-              <a:t>Name, </a:t>
-            </a:r>
-            <a:r>
-              <a:rPr lang="en-US" sz="800" dirty="0" smtClean="0"/>
-              <a:t>Offer4 </a:t>
-            </a:r>
-            <a:r>
-              <a:rPr lang="en-US" sz="800" dirty="0"/>
-              <a:t>Type, </a:t>
-            </a:r>
-            <a:r>
-              <a:rPr lang="en-US" sz="800" dirty="0" smtClean="0"/>
-              <a:t>Offer4 </a:t>
-            </a:r>
-            <a:r>
-              <a:rPr lang="en-US" sz="800" dirty="0"/>
-              <a:t>Value, </a:t>
-            </a:r>
-            <a:r>
-              <a:rPr lang="en-US" sz="800" dirty="0" smtClean="0"/>
-              <a:t>Offer4 Price</a:t>
-            </a:r>
-            <a:endParaRPr lang="en-US" sz="800" dirty="0"/>
+              <a:t>Fixed Rate        , Tnkoil1         , 1800 </a:t>
+            </a:r>
+            <a:endParaRPr lang="en-US" sz="800" dirty="0" smtClean="0"/>
           </a:p>
         </p:txBody>
       </p:sp>
@@ -8149,16 +8068,20 @@
             <a:pPr algn="ctr"/>
             <a:r>
               <a:rPr lang="en-US" sz="1000" dirty="0" smtClean="0"/>
-              <a:t>Cost Price1, GST1</a:t>
+              <a:t>CPWT               CPWOT          </a:t>
+            </a:r>
+            <a:r>
+              <a:rPr lang="en-US" sz="1000" dirty="0" smtClean="0"/>
+              <a:t>GST</a:t>
             </a:r>
           </a:p>
           <a:p>
             <a:pPr algn="ctr"/>
             <a:r>
               <a:rPr lang="en-US" sz="1000" dirty="0" smtClean="0"/>
-              <a:t>Cost Price2, GST2</a:t>
-            </a:r>
-            <a:endParaRPr lang="en-IN" sz="1000" dirty="0"/>
+              <a:t>100                90                GST5%</a:t>
+            </a:r>
+            <a:endParaRPr lang="en-US" sz="1000" dirty="0" smtClean="0"/>
           </a:p>
         </p:txBody>
       </p:sp>
@@ -8207,11 +8130,8 @@
             <a:pPr algn="ctr"/>
             <a:r>
               <a:rPr lang="en-US" sz="900" b="1" dirty="0" smtClean="0"/>
-              <a:t>Branch1, Value1, Intransit1, Running sale1</a:t>
-            </a:r>
-          </a:p>
-          <a:p>
-            <a:pPr algn="ctr"/>
+              <a:t>Quantity 10 Weight in KGs 100.00</a:t>
+            </a:r>
             <a:endParaRPr lang="en-US" sz="900" b="1" dirty="0" smtClean="0"/>
           </a:p>
         </p:txBody>
@@ -8464,6 +8384,50 @@
                 <a:schemeClr val="tx1"/>
               </a:solidFill>
             </a:endParaRPr>
+          </a:p>
+        </p:txBody>
+      </p:sp>
+      <p:sp>
+        <p:nvSpPr>
+          <p:cNvPr id="20" name="Rectangle 19"/>
+          <p:cNvSpPr/>
+          <p:nvPr/>
+        </p:nvSpPr>
+        <p:spPr>
+          <a:xfrm>
+            <a:off x="3615655" y="1570368"/>
+            <a:ext cx="1728132" cy="198152"/>
+          </a:xfrm>
+          <a:prstGeom prst="rect">
+            <a:avLst/>
+          </a:prstGeom>
+        </p:spPr>
+        <p:style>
+          <a:lnRef idx="2">
+            <a:schemeClr val="accent1">
+              <a:shade val="50000"/>
+            </a:schemeClr>
+          </a:lnRef>
+          <a:fillRef idx="1">
+            <a:schemeClr val="accent1"/>
+          </a:fillRef>
+          <a:effectRef idx="0">
+            <a:schemeClr val="accent1"/>
+          </a:effectRef>
+          <a:fontRef idx="minor">
+            <a:schemeClr val="lt1"/>
+          </a:fontRef>
+        </p:style>
+        <p:txBody>
+          <a:bodyPr rtlCol="0" anchor="ctr"/>
+          <a:lstStyle/>
+          <a:p>
+            <a:pPr algn="ctr"/>
+            <a:r>
+              <a:rPr lang="en-US" sz="1200" dirty="0" smtClean="0"/>
+              <a:t>Branch Drop Down</a:t>
+            </a:r>
+            <a:endParaRPr lang="en-IN" sz="1200" dirty="0"/>
           </a:p>
         </p:txBody>
       </p:sp>

</xml_diff>